<commit_message>
added Tests and .cs files for Tennis and the modified Figures.pptx
</commit_message>
<xml_diff>
--- a/Figures.pptx
+++ b/Figures.pptx
@@ -118,7 +118,7 @@
   </p:defaultTextStyle>
   <p:extLst>
     <p:ext uri="{EFAFB233-063F-42B5-8137-9DF3F51BA10A}">
-      <p15:sldGuideLst xmlns:p15="http://schemas.microsoft.com/office/powerpoint/2012/main"/>
+      <p15:sldGuideLst xmlns:p15="http://schemas.microsoft.com/office/powerpoint/2012/main" xmlns=""/>
     </p:ext>
   </p:extLst>
 </p:presentation>
@@ -255,7 +255,7 @@
           <a:p>
             <a:fld id="{98A6C48D-38F7-465D-BB70-A05D95915A7A}" type="datetimeFigureOut">
               <a:rPr lang="en-US" smtClean="0"/>
-              <a:t>11-Dec-15</a:t>
+              <a:t>1/7/2016</a:t>
             </a:fld>
             <a:endParaRPr lang="en-US"/>
           </a:p>
@@ -425,7 +425,7 @@
           <a:p>
             <a:fld id="{98A6C48D-38F7-465D-BB70-A05D95915A7A}" type="datetimeFigureOut">
               <a:rPr lang="en-US" smtClean="0"/>
-              <a:t>11-Dec-15</a:t>
+              <a:t>1/7/2016</a:t>
             </a:fld>
             <a:endParaRPr lang="en-US"/>
           </a:p>
@@ -605,7 +605,7 @@
           <a:p>
             <a:fld id="{98A6C48D-38F7-465D-BB70-A05D95915A7A}" type="datetimeFigureOut">
               <a:rPr lang="en-US" smtClean="0"/>
-              <a:t>11-Dec-15</a:t>
+              <a:t>1/7/2016</a:t>
             </a:fld>
             <a:endParaRPr lang="en-US"/>
           </a:p>
@@ -775,7 +775,7 @@
           <a:p>
             <a:fld id="{98A6C48D-38F7-465D-BB70-A05D95915A7A}" type="datetimeFigureOut">
               <a:rPr lang="en-US" smtClean="0"/>
-              <a:t>11-Dec-15</a:t>
+              <a:t>1/7/2016</a:t>
             </a:fld>
             <a:endParaRPr lang="en-US"/>
           </a:p>
@@ -1021,7 +1021,7 @@
           <a:p>
             <a:fld id="{98A6C48D-38F7-465D-BB70-A05D95915A7A}" type="datetimeFigureOut">
               <a:rPr lang="en-US" smtClean="0"/>
-              <a:t>11-Dec-15</a:t>
+              <a:t>1/7/2016</a:t>
             </a:fld>
             <a:endParaRPr lang="en-US"/>
           </a:p>
@@ -1253,7 +1253,7 @@
           <a:p>
             <a:fld id="{98A6C48D-38F7-465D-BB70-A05D95915A7A}" type="datetimeFigureOut">
               <a:rPr lang="en-US" smtClean="0"/>
-              <a:t>11-Dec-15</a:t>
+              <a:t>1/7/2016</a:t>
             </a:fld>
             <a:endParaRPr lang="en-US"/>
           </a:p>
@@ -1620,7 +1620,7 @@
           <a:p>
             <a:fld id="{98A6C48D-38F7-465D-BB70-A05D95915A7A}" type="datetimeFigureOut">
               <a:rPr lang="en-US" smtClean="0"/>
-              <a:t>11-Dec-15</a:t>
+              <a:t>1/7/2016</a:t>
             </a:fld>
             <a:endParaRPr lang="en-US"/>
           </a:p>
@@ -1738,7 +1738,7 @@
           <a:p>
             <a:fld id="{98A6C48D-38F7-465D-BB70-A05D95915A7A}" type="datetimeFigureOut">
               <a:rPr lang="en-US" smtClean="0"/>
-              <a:t>11-Dec-15</a:t>
+              <a:t>1/7/2016</a:t>
             </a:fld>
             <a:endParaRPr lang="en-US"/>
           </a:p>
@@ -1833,7 +1833,7 @@
           <a:p>
             <a:fld id="{98A6C48D-38F7-465D-BB70-A05D95915A7A}" type="datetimeFigureOut">
               <a:rPr lang="en-US" smtClean="0"/>
-              <a:t>11-Dec-15</a:t>
+              <a:t>1/7/2016</a:t>
             </a:fld>
             <a:endParaRPr lang="en-US"/>
           </a:p>
@@ -2110,7 +2110,7 @@
           <a:p>
             <a:fld id="{98A6C48D-38F7-465D-BB70-A05D95915A7A}" type="datetimeFigureOut">
               <a:rPr lang="en-US" smtClean="0"/>
-              <a:t>11-Dec-15</a:t>
+              <a:t>1/7/2016</a:t>
             </a:fld>
             <a:endParaRPr lang="en-US"/>
           </a:p>
@@ -2363,7 +2363,7 @@
           <a:p>
             <a:fld id="{98A6C48D-38F7-465D-BB70-A05D95915A7A}" type="datetimeFigureOut">
               <a:rPr lang="en-US" smtClean="0"/>
-              <a:t>11-Dec-15</a:t>
+              <a:t>1/7/2016</a:t>
             </a:fld>
             <a:endParaRPr lang="en-US"/>
           </a:p>
@@ -2576,7 +2576,7 @@
           <a:p>
             <a:fld id="{98A6C48D-38F7-465D-BB70-A05D95915A7A}" type="datetimeFigureOut">
               <a:rPr lang="en-US" smtClean="0"/>
-              <a:t>11-Dec-15</a:t>
+              <a:t>1/7/2016</a:t>
             </a:fld>
             <a:endParaRPr lang="en-US"/>
           </a:p>
@@ -3363,7 +3363,13 @@
               <a:lumOff val="80000"/>
             </a:schemeClr>
           </a:solidFill>
-          <a:ln w="38100"/>
+          <a:ln w="38100">
+            <a:solidFill>
+              <a:schemeClr val="accent6">
+                <a:lumMod val="75000"/>
+              </a:schemeClr>
+            </a:solidFill>
+          </a:ln>
         </p:spPr>
         <p:style>
           <a:lnRef idx="2">
@@ -3410,7 +3416,19 @@
               <a:gd name="adj" fmla="val 35833"/>
             </a:avLst>
           </a:prstGeom>
-          <a:ln w="38100"/>
+          <a:solidFill>
+            <a:schemeClr val="accent6">
+              <a:lumMod val="20000"/>
+              <a:lumOff val="80000"/>
+            </a:schemeClr>
+          </a:solidFill>
+          <a:ln w="38100">
+            <a:solidFill>
+              <a:schemeClr val="accent6">
+                <a:lumMod val="75000"/>
+              </a:schemeClr>
+            </a:solidFill>
+          </a:ln>
         </p:spPr>
         <p:style>
           <a:lnRef idx="2">
@@ -3457,7 +3475,19 @@
               <a:gd name="adj" fmla="val 35833"/>
             </a:avLst>
           </a:prstGeom>
-          <a:ln w="38100"/>
+          <a:solidFill>
+            <a:schemeClr val="accent6">
+              <a:lumMod val="20000"/>
+              <a:lumOff val="80000"/>
+            </a:schemeClr>
+          </a:solidFill>
+          <a:ln w="38100">
+            <a:solidFill>
+              <a:schemeClr val="accent6">
+                <a:lumMod val="75000"/>
+              </a:schemeClr>
+            </a:solidFill>
+          </a:ln>
         </p:spPr>
         <p:style>
           <a:lnRef idx="2">
@@ -3504,7 +3534,19 @@
               <a:gd name="adj" fmla="val 35833"/>
             </a:avLst>
           </a:prstGeom>
-          <a:ln w="38100"/>
+          <a:solidFill>
+            <a:schemeClr val="accent6">
+              <a:lumMod val="20000"/>
+              <a:lumOff val="80000"/>
+            </a:schemeClr>
+          </a:solidFill>
+          <a:ln w="38100">
+            <a:solidFill>
+              <a:schemeClr val="accent6">
+                <a:lumMod val="75000"/>
+              </a:schemeClr>
+            </a:solidFill>
+          </a:ln>
         </p:spPr>
         <p:style>
           <a:lnRef idx="2">
@@ -3552,7 +3594,11 @@
           <a:prstGeom prst="curvedConnector2">
             <a:avLst/>
           </a:prstGeom>
-          <a:ln w="38100"/>
+          <a:ln w="38100">
+            <a:solidFill>
+              <a:srgbClr val="C00000"/>
+            </a:solidFill>
+          </a:ln>
         </p:spPr>
         <p:style>
           <a:lnRef idx="2">
@@ -3586,7 +3632,13 @@
           <a:prstGeom prst="curvedConnector2">
             <a:avLst/>
           </a:prstGeom>
-          <a:ln w="38100"/>
+          <a:ln w="38100">
+            <a:solidFill>
+              <a:schemeClr val="accent6">
+                <a:lumMod val="75000"/>
+              </a:schemeClr>
+            </a:solidFill>
+          </a:ln>
         </p:spPr>
         <p:style>
           <a:lnRef idx="2">
@@ -3620,7 +3672,11 @@
           <a:prstGeom prst="curvedConnector2">
             <a:avLst/>
           </a:prstGeom>
-          <a:ln w="38100"/>
+          <a:ln w="38100">
+            <a:solidFill>
+              <a:srgbClr val="C00000"/>
+            </a:solidFill>
+          </a:ln>
         </p:spPr>
         <p:style>
           <a:lnRef idx="2">
@@ -3654,7 +3710,13 @@
           <a:prstGeom prst="curvedConnector2">
             <a:avLst/>
           </a:prstGeom>
-          <a:ln w="38100"/>
+          <a:ln w="38100">
+            <a:solidFill>
+              <a:schemeClr val="accent6">
+                <a:lumMod val="75000"/>
+              </a:schemeClr>
+            </a:solidFill>
+          </a:ln>
         </p:spPr>
         <p:style>
           <a:lnRef idx="2">
@@ -3690,7 +3752,11 @@
               <a:gd name="adj1" fmla="val 50000"/>
             </a:avLst>
           </a:prstGeom>
-          <a:ln w="38100"/>
+          <a:ln w="38100">
+            <a:solidFill>
+              <a:srgbClr val="C00000"/>
+            </a:solidFill>
+          </a:ln>
         </p:spPr>
         <p:style>
           <a:lnRef idx="2">
@@ -3715,7 +3781,7 @@
         </p:nvCxnSpPr>
         <p:spPr>
           <a:xfrm flipH="1">
-            <a:off x="6606987" y="886067"/>
+            <a:off x="7309139" y="307569"/>
             <a:ext cx="493060" cy="123939"/>
           </a:xfrm>
           <a:prstGeom prst="straightConnector1">
@@ -3761,107 +3827,19 @@
               <a:gd name="adj" fmla="val 35833"/>
             </a:avLst>
           </a:prstGeom>
-          <a:ln w="38100"/>
-        </p:spPr>
-        <p:style>
-          <a:lnRef idx="2">
-            <a:schemeClr val="accent5"/>
-          </a:lnRef>
-          <a:fillRef idx="1">
-            <a:schemeClr val="lt1"/>
-          </a:fillRef>
-          <a:effectRef idx="0">
-            <a:schemeClr val="accent5"/>
-          </a:effectRef>
-          <a:fontRef idx="minor">
-            <a:schemeClr val="dk1"/>
-          </a:fontRef>
-        </p:style>
-        <p:txBody>
-          <a:bodyPr lIns="0" tIns="0" rIns="0" bIns="36000" rtlCol="0" anchor="ctr">
-            <a:spAutoFit/>
-          </a:bodyPr>
-          <a:lstStyle/>
-          <a:p>
-            <a:pPr algn="ctr"/>
-            <a:r>
-              <a:rPr lang="en-US" sz="2000" noProof="1" smtClean="0"/>
-              <a:t>Maria</a:t>
-            </a:r>
-            <a:endParaRPr lang="en-US" sz="2000" noProof="1"/>
-          </a:p>
-        </p:txBody>
-      </p:sp>
-      <p:sp>
-        <p:nvSpPr>
-          <p:cNvPr id="44" name="Rounded Rectangle 43"/>
-          <p:cNvSpPr/>
-          <p:nvPr/>
-        </p:nvSpPr>
-        <p:spPr>
-          <a:xfrm>
-            <a:off x="8171327" y="1552903"/>
-            <a:ext cx="793376" cy="433988"/>
-          </a:xfrm>
-          <a:prstGeom prst="roundRect">
-            <a:avLst>
-              <a:gd name="adj" fmla="val 35833"/>
-            </a:avLst>
-          </a:prstGeom>
-          <a:ln w="38100"/>
-        </p:spPr>
-        <p:style>
-          <a:lnRef idx="2">
-            <a:schemeClr val="accent5"/>
-          </a:lnRef>
-          <a:fillRef idx="1">
-            <a:schemeClr val="lt1"/>
-          </a:fillRef>
-          <a:effectRef idx="0">
-            <a:schemeClr val="accent5"/>
-          </a:effectRef>
-          <a:fontRef idx="minor">
-            <a:schemeClr val="dk1"/>
-          </a:fontRef>
-        </p:style>
-        <p:txBody>
-          <a:bodyPr lIns="0" tIns="0" rIns="0" bIns="36000" rtlCol="0" anchor="ctr">
-            <a:spAutoFit/>
-          </a:bodyPr>
-          <a:lstStyle/>
-          <a:p>
-            <a:pPr algn="ctr"/>
-            <a:r>
-              <a:rPr lang="en-US" sz="2000" noProof="1" smtClean="0"/>
-              <a:t>Ivan</a:t>
-            </a:r>
-            <a:endParaRPr lang="en-US" sz="2000" noProof="1"/>
-          </a:p>
-        </p:txBody>
-      </p:sp>
-      <p:sp>
-        <p:nvSpPr>
-          <p:cNvPr id="45" name="Rounded Rectangle 44"/>
-          <p:cNvSpPr/>
-          <p:nvPr/>
-        </p:nvSpPr>
-        <p:spPr>
-          <a:xfrm>
-            <a:off x="9905996" y="1552903"/>
-            <a:ext cx="927847" cy="433988"/>
-          </a:xfrm>
-          <a:prstGeom prst="roundRect">
-            <a:avLst>
-              <a:gd name="adj" fmla="val 35833"/>
-            </a:avLst>
-          </a:prstGeom>
           <a:solidFill>
             <a:schemeClr val="accent6">
               <a:lumMod val="20000"/>
               <a:lumOff val="80000"/>
             </a:schemeClr>
           </a:solidFill>
-          <a:ln w="38100"/>
+          <a:ln w="38100">
+            <a:solidFill>
+              <a:schemeClr val="accent6">
+                <a:lumMod val="75000"/>
+              </a:schemeClr>
+            </a:solidFill>
+          </a:ln>
         </p:spPr>
         <p:style>
           <a:lnRef idx="2">
@@ -3885,29 +3863,159 @@
           <a:p>
             <a:pPr algn="ctr"/>
             <a:r>
-              <a:rPr lang="en-US" sz="2000" noProof="1"/>
-              <a:t>Pesho</a:t>
-            </a:r>
-          </a:p>
-        </p:txBody>
-      </p:sp>
-      <p:sp>
-        <p:nvSpPr>
-          <p:cNvPr id="46" name="Rounded Rectangle 45"/>
+              <a:rPr lang="en-US" sz="2000" noProof="1" smtClean="0"/>
+              <a:t>Maria</a:t>
+            </a:r>
+            <a:endParaRPr lang="en-US" sz="2000" noProof="1"/>
+          </a:p>
+        </p:txBody>
+      </p:sp>
+      <p:sp>
+        <p:nvSpPr>
+          <p:cNvPr id="44" name="Rounded Rectangle 43"/>
           <p:cNvSpPr/>
           <p:nvPr/>
         </p:nvSpPr>
         <p:spPr>
           <a:xfrm>
-            <a:off x="9058831" y="2205089"/>
-            <a:ext cx="927847" cy="433988"/>
+            <a:off x="8171327" y="1552903"/>
+            <a:ext cx="793376" cy="433988"/>
           </a:xfrm>
           <a:prstGeom prst="roundRect">
             <a:avLst>
               <a:gd name="adj" fmla="val 35833"/>
             </a:avLst>
           </a:prstGeom>
-          <a:ln w="38100"/>
+          <a:solidFill>
+            <a:schemeClr val="accent6">
+              <a:lumMod val="20000"/>
+              <a:lumOff val="80000"/>
+            </a:schemeClr>
+          </a:solidFill>
+          <a:ln w="38100">
+            <a:solidFill>
+              <a:schemeClr val="accent6">
+                <a:lumMod val="75000"/>
+              </a:schemeClr>
+            </a:solidFill>
+          </a:ln>
+        </p:spPr>
+        <p:style>
+          <a:lnRef idx="2">
+            <a:schemeClr val="accent5"/>
+          </a:lnRef>
+          <a:fillRef idx="1">
+            <a:schemeClr val="lt1"/>
+          </a:fillRef>
+          <a:effectRef idx="0">
+            <a:schemeClr val="accent5"/>
+          </a:effectRef>
+          <a:fontRef idx="minor">
+            <a:schemeClr val="dk1"/>
+          </a:fontRef>
+        </p:style>
+        <p:txBody>
+          <a:bodyPr lIns="0" tIns="0" rIns="0" bIns="36000" rtlCol="0" anchor="ctr">
+            <a:spAutoFit/>
+          </a:bodyPr>
+          <a:lstStyle/>
+          <a:p>
+            <a:pPr algn="ctr"/>
+            <a:r>
+              <a:rPr lang="en-US" sz="2000" noProof="1" smtClean="0"/>
+              <a:t>Ivan</a:t>
+            </a:r>
+            <a:endParaRPr lang="en-US" sz="2000" noProof="1"/>
+          </a:p>
+        </p:txBody>
+      </p:sp>
+      <p:sp>
+        <p:nvSpPr>
+          <p:cNvPr id="45" name="Rounded Rectangle 44"/>
+          <p:cNvSpPr/>
+          <p:nvPr/>
+        </p:nvSpPr>
+        <p:spPr>
+          <a:xfrm>
+            <a:off x="9905996" y="1552903"/>
+            <a:ext cx="927847" cy="433988"/>
+          </a:xfrm>
+          <a:prstGeom prst="roundRect">
+            <a:avLst>
+              <a:gd name="adj" fmla="val 35833"/>
+            </a:avLst>
+          </a:prstGeom>
+          <a:solidFill>
+            <a:schemeClr val="accent6">
+              <a:lumMod val="20000"/>
+              <a:lumOff val="80000"/>
+            </a:schemeClr>
+          </a:solidFill>
+          <a:ln w="38100">
+            <a:solidFill>
+              <a:schemeClr val="accent6">
+                <a:lumMod val="75000"/>
+              </a:schemeClr>
+            </a:solidFill>
+          </a:ln>
+        </p:spPr>
+        <p:style>
+          <a:lnRef idx="2">
+            <a:schemeClr val="accent5"/>
+          </a:lnRef>
+          <a:fillRef idx="1">
+            <a:schemeClr val="lt1"/>
+          </a:fillRef>
+          <a:effectRef idx="0">
+            <a:schemeClr val="accent5"/>
+          </a:effectRef>
+          <a:fontRef idx="minor">
+            <a:schemeClr val="dk1"/>
+          </a:fontRef>
+        </p:style>
+        <p:txBody>
+          <a:bodyPr lIns="0" tIns="0" rIns="0" bIns="36000" rtlCol="0" anchor="ctr">
+            <a:spAutoFit/>
+          </a:bodyPr>
+          <a:lstStyle/>
+          <a:p>
+            <a:pPr algn="ctr"/>
+            <a:r>
+              <a:rPr lang="en-US" sz="2000" noProof="1"/>
+              <a:t>Pesho</a:t>
+            </a:r>
+          </a:p>
+        </p:txBody>
+      </p:sp>
+      <p:sp>
+        <p:nvSpPr>
+          <p:cNvPr id="46" name="Rounded Rectangle 45"/>
+          <p:cNvSpPr/>
+          <p:nvPr/>
+        </p:nvSpPr>
+        <p:spPr>
+          <a:xfrm>
+            <a:off x="9058831" y="2205089"/>
+            <a:ext cx="927847" cy="433988"/>
+          </a:xfrm>
+          <a:prstGeom prst="roundRect">
+            <a:avLst>
+              <a:gd name="adj" fmla="val 35833"/>
+            </a:avLst>
+          </a:prstGeom>
+          <a:solidFill>
+            <a:schemeClr val="accent6">
+              <a:lumMod val="20000"/>
+              <a:lumOff val="80000"/>
+            </a:schemeClr>
+          </a:solidFill>
+          <a:ln w="38100">
+            <a:solidFill>
+              <a:schemeClr val="accent6">
+                <a:lumMod val="75000"/>
+              </a:schemeClr>
+            </a:solidFill>
+          </a:ln>
         </p:spPr>
         <p:style>
           <a:lnRef idx="2">
@@ -3955,7 +4063,13 @@
           <a:prstGeom prst="curvedConnector2">
             <a:avLst/>
           </a:prstGeom>
-          <a:ln w="38100"/>
+          <a:ln w="38100">
+            <a:solidFill>
+              <a:schemeClr val="accent6">
+                <a:lumMod val="75000"/>
+              </a:schemeClr>
+            </a:solidFill>
+          </a:ln>
         </p:spPr>
         <p:style>
           <a:lnRef idx="2">
@@ -3989,7 +4103,11 @@
           <a:prstGeom prst="curvedConnector2">
             <a:avLst/>
           </a:prstGeom>
-          <a:ln w="38100"/>
+          <a:ln w="38100">
+            <a:solidFill>
+              <a:srgbClr val="C00000"/>
+            </a:solidFill>
+          </a:ln>
         </p:spPr>
         <p:style>
           <a:lnRef idx="2">
@@ -4023,7 +4141,13 @@
           <a:prstGeom prst="curvedConnector2">
             <a:avLst/>
           </a:prstGeom>
-          <a:ln w="38100"/>
+          <a:ln w="38100">
+            <a:solidFill>
+              <a:schemeClr val="accent6">
+                <a:lumMod val="75000"/>
+              </a:schemeClr>
+            </a:solidFill>
+          </a:ln>
         </p:spPr>
         <p:style>
           <a:lnRef idx="2">
@@ -4057,7 +4181,11 @@
           <a:prstGeom prst="curvedConnector2">
             <a:avLst/>
           </a:prstGeom>
-          <a:ln w="38100"/>
+          <a:ln w="38100">
+            <a:solidFill>
+              <a:srgbClr val="C00000"/>
+            </a:solidFill>
+          </a:ln>
         </p:spPr>
         <p:style>
           <a:lnRef idx="2">
@@ -4093,7 +4221,11 @@
               <a:gd name="adj1" fmla="val 50000"/>
             </a:avLst>
           </a:prstGeom>
-          <a:ln w="38100"/>
+          <a:ln w="38100">
+            <a:solidFill>
+              <a:srgbClr val="C00000"/>
+            </a:solidFill>
+          </a:ln>
         </p:spPr>
         <p:style>
           <a:lnRef idx="2">
@@ -4118,7 +4250,7 @@
         </p:nvCxnSpPr>
         <p:spPr>
           <a:xfrm flipH="1">
-            <a:off x="10493178" y="1050347"/>
+            <a:off x="10879847" y="680566"/>
             <a:ext cx="304804" cy="411002"/>
           </a:xfrm>
           <a:prstGeom prst="straightConnector1">
@@ -4158,6 +4290,13 @@
   <p:clrMapOvr>
     <a:masterClrMapping/>
   </p:clrMapOvr>
+  <p:timing>
+    <p:tnLst>
+      <p:par>
+        <p:cTn id="1" dur="indefinite" restart="never" nodeType="tmRoot"/>
+      </p:par>
+    </p:tnLst>
+  </p:timing>
 </p:sld>
 </file>
 
@@ -12272,6 +12411,13 @@
   <p:clrMapOvr>
     <a:masterClrMapping/>
   </p:clrMapOvr>
+  <p:timing>
+    <p:tnLst>
+      <p:par>
+        <p:cTn id="1" dur="indefinite" restart="never" nodeType="tmRoot"/>
+      </p:par>
+    </p:tnLst>
+  </p:timing>
 </p:sld>
 </file>
 
@@ -13644,6 +13790,13 @@
   <p:clrMapOvr>
     <a:masterClrMapping/>
   </p:clrMapOvr>
+  <p:timing>
+    <p:tnLst>
+      <p:par>
+        <p:cTn id="1" dur="indefinite" restart="never" nodeType="tmRoot"/>
+      </p:par>
+    </p:tnLst>
+  </p:timing>
 </p:sld>
 </file>
 
@@ -13672,182 +13825,7 @@
         </p:nvSpPr>
         <p:spPr>
           <a:xfrm>
-            <a:off x="1837388" y="890146"/>
-            <a:ext cx="874059" cy="433988"/>
-          </a:xfrm>
-          <a:prstGeom prst="roundRect">
-            <a:avLst>
-              <a:gd name="adj" fmla="val 35833"/>
-            </a:avLst>
-          </a:prstGeom>
-          <a:ln w="38100"/>
-        </p:spPr>
-        <p:style>
-          <a:lnRef idx="2">
-            <a:schemeClr val="accent5"/>
-          </a:lnRef>
-          <a:fillRef idx="1">
-            <a:schemeClr val="lt1"/>
-          </a:fillRef>
-          <a:effectRef idx="0">
-            <a:schemeClr val="accent5"/>
-          </a:effectRef>
-          <a:fontRef idx="minor">
-            <a:schemeClr val="dk1"/>
-          </a:fontRef>
-        </p:style>
-        <p:txBody>
-          <a:bodyPr lIns="0" tIns="0" rIns="0" bIns="36000" rtlCol="0" anchor="ctr">
-            <a:spAutoFit/>
-          </a:bodyPr>
-          <a:lstStyle/>
-          <a:p>
-            <a:pPr algn="ctr"/>
-            <a:r>
-              <a:rPr lang="en-US" sz="2000" noProof="1" smtClean="0"/>
-              <a:t>Maria</a:t>
-            </a:r>
-            <a:endParaRPr lang="en-US" sz="2000" noProof="1"/>
-          </a:p>
-        </p:txBody>
-      </p:sp>
-      <p:sp>
-        <p:nvSpPr>
-          <p:cNvPr id="6" name="Rounded Rectangle 5"/>
-          <p:cNvSpPr/>
-          <p:nvPr/>
-        </p:nvSpPr>
-        <p:spPr>
-          <a:xfrm>
-            <a:off x="711199" y="890146"/>
-            <a:ext cx="729501" cy="433988"/>
-          </a:xfrm>
-          <a:prstGeom prst="roundRect">
-            <a:avLst>
-              <a:gd name="adj" fmla="val 35833"/>
-            </a:avLst>
-          </a:prstGeom>
-          <a:ln w="38100"/>
-        </p:spPr>
-        <p:style>
-          <a:lnRef idx="2">
-            <a:schemeClr val="accent5"/>
-          </a:lnRef>
-          <a:fillRef idx="1">
-            <a:schemeClr val="lt1"/>
-          </a:fillRef>
-          <a:effectRef idx="0">
-            <a:schemeClr val="accent5"/>
-          </a:effectRef>
-          <a:fontRef idx="minor">
-            <a:schemeClr val="dk1"/>
-          </a:fontRef>
-        </p:style>
-        <p:txBody>
-          <a:bodyPr lIns="0" tIns="0" rIns="0" bIns="36000" rtlCol="0" anchor="ctr">
-            <a:spAutoFit/>
-          </a:bodyPr>
-          <a:lstStyle/>
-          <a:p>
-            <a:pPr algn="ctr"/>
-            <a:r>
-              <a:rPr lang="en-US" sz="2000" noProof="1" smtClean="0"/>
-              <a:t>Ivan</a:t>
-            </a:r>
-            <a:endParaRPr lang="en-US" sz="2000" noProof="1"/>
-          </a:p>
-        </p:txBody>
-      </p:sp>
-      <p:sp>
-        <p:nvSpPr>
-          <p:cNvPr id="7" name="Rounded Rectangle 6"/>
-          <p:cNvSpPr/>
-          <p:nvPr/>
-        </p:nvSpPr>
-        <p:spPr>
-          <a:xfrm>
-            <a:off x="1149720" y="1553828"/>
-            <a:ext cx="927847" cy="433988"/>
-          </a:xfrm>
-          <a:prstGeom prst="roundRect">
-            <a:avLst>
-              <a:gd name="adj" fmla="val 35833"/>
-            </a:avLst>
-          </a:prstGeom>
-          <a:ln w="38100"/>
-        </p:spPr>
-        <p:style>
-          <a:lnRef idx="2">
-            <a:schemeClr val="accent5"/>
-          </a:lnRef>
-          <a:fillRef idx="1">
-            <a:schemeClr val="lt1"/>
-          </a:fillRef>
-          <a:effectRef idx="0">
-            <a:schemeClr val="accent5"/>
-          </a:effectRef>
-          <a:fontRef idx="minor">
-            <a:schemeClr val="dk1"/>
-          </a:fontRef>
-        </p:style>
-        <p:txBody>
-          <a:bodyPr lIns="0" tIns="0" rIns="0" bIns="36000" rtlCol="0" anchor="ctr">
-            <a:spAutoFit/>
-          </a:bodyPr>
-          <a:lstStyle/>
-          <a:p>
-            <a:pPr algn="ctr"/>
-            <a:r>
-              <a:rPr lang="en-US" sz="2000" noProof="1" smtClean="0"/>
-              <a:t>Pesho</a:t>
-            </a:r>
-            <a:endParaRPr lang="en-US" sz="2000" noProof="1"/>
-          </a:p>
-        </p:txBody>
-      </p:sp>
-      <p:cxnSp>
-        <p:nvCxnSpPr>
-          <p:cNvPr id="11" name="Straight Connector 9"/>
-          <p:cNvCxnSpPr>
-            <a:stCxn id="4" idx="1"/>
-            <a:endCxn id="6" idx="3"/>
-          </p:cNvCxnSpPr>
-          <p:nvPr/>
-        </p:nvCxnSpPr>
-        <p:spPr>
-          <a:xfrm flipH="1">
-            <a:off x="1440700" y="1107140"/>
-            <a:ext cx="396688" cy="0"/>
-          </a:xfrm>
-          <a:prstGeom prst="straightConnector1">
-            <a:avLst/>
-          </a:prstGeom>
-          <a:ln w="38100"/>
-        </p:spPr>
-        <p:style>
-          <a:lnRef idx="2">
-            <a:schemeClr val="accent5"/>
-          </a:lnRef>
-          <a:fillRef idx="1">
-            <a:schemeClr val="lt1"/>
-          </a:fillRef>
-          <a:effectRef idx="0">
-            <a:schemeClr val="accent5"/>
-          </a:effectRef>
-          <a:fontRef idx="minor">
-            <a:schemeClr val="dk1"/>
-          </a:fontRef>
-        </p:style>
-      </p:cxnSp>
-      <p:sp>
-        <p:nvSpPr>
-          <p:cNvPr id="40" name="Rounded Rectangle 39"/>
-          <p:cNvSpPr/>
-          <p:nvPr/>
-        </p:nvSpPr>
-        <p:spPr>
-          <a:xfrm>
-            <a:off x="5050488" y="890146"/>
+            <a:off x="1923845" y="667558"/>
             <a:ext cx="874059" cy="433988"/>
           </a:xfrm>
           <a:prstGeom prst="roundRect">
@@ -13861,185 +13839,12 @@
               <a:lumOff val="80000"/>
             </a:schemeClr>
           </a:solidFill>
-          <a:ln w="38100"/>
-        </p:spPr>
-        <p:style>
-          <a:lnRef idx="2">
-            <a:schemeClr val="accent5"/>
-          </a:lnRef>
-          <a:fillRef idx="1">
-            <a:schemeClr val="lt1"/>
-          </a:fillRef>
-          <a:effectRef idx="0">
-            <a:schemeClr val="accent5"/>
-          </a:effectRef>
-          <a:fontRef idx="minor">
-            <a:schemeClr val="dk1"/>
-          </a:fontRef>
-        </p:style>
-        <p:txBody>
-          <a:bodyPr lIns="0" tIns="0" rIns="0" bIns="36000" rtlCol="0" anchor="ctr">
-            <a:spAutoFit/>
-          </a:bodyPr>
-          <a:lstStyle/>
-          <a:p>
-            <a:pPr algn="ctr"/>
-            <a:r>
-              <a:rPr lang="en-US" sz="2000" noProof="1"/>
-              <a:t>Maria</a:t>
-            </a:r>
-          </a:p>
-        </p:txBody>
-      </p:sp>
-      <p:sp>
-        <p:nvSpPr>
-          <p:cNvPr id="41" name="Rounded Rectangle 40"/>
-          <p:cNvSpPr/>
-          <p:nvPr/>
-        </p:nvSpPr>
-        <p:spPr>
-          <a:xfrm>
-            <a:off x="3924299" y="890146"/>
-            <a:ext cx="729501" cy="433988"/>
-          </a:xfrm>
-          <a:prstGeom prst="roundRect">
-            <a:avLst>
-              <a:gd name="adj" fmla="val 35833"/>
-            </a:avLst>
-          </a:prstGeom>
-          <a:ln w="38100"/>
-        </p:spPr>
-        <p:style>
-          <a:lnRef idx="2">
-            <a:schemeClr val="accent5"/>
-          </a:lnRef>
-          <a:fillRef idx="1">
-            <a:schemeClr val="lt1"/>
-          </a:fillRef>
-          <a:effectRef idx="0">
-            <a:schemeClr val="accent5"/>
-          </a:effectRef>
-          <a:fontRef idx="minor">
-            <a:schemeClr val="dk1"/>
-          </a:fontRef>
-        </p:style>
-        <p:txBody>
-          <a:bodyPr lIns="0" tIns="0" rIns="0" bIns="36000" rtlCol="0" anchor="ctr">
-            <a:spAutoFit/>
-          </a:bodyPr>
-          <a:lstStyle/>
-          <a:p>
-            <a:pPr algn="ctr"/>
-            <a:r>
-              <a:rPr lang="en-US" sz="2000" noProof="1" smtClean="0"/>
-              <a:t>Ivan</a:t>
-            </a:r>
-            <a:endParaRPr lang="en-US" sz="2000" noProof="1"/>
-          </a:p>
-        </p:txBody>
-      </p:sp>
-      <p:sp>
-        <p:nvSpPr>
-          <p:cNvPr id="42" name="Rounded Rectangle 41"/>
-          <p:cNvSpPr/>
-          <p:nvPr/>
-        </p:nvSpPr>
-        <p:spPr>
-          <a:xfrm>
-            <a:off x="4388220" y="1553828"/>
-            <a:ext cx="927847" cy="433988"/>
-          </a:xfrm>
-          <a:prstGeom prst="roundRect">
-            <a:avLst>
-              <a:gd name="adj" fmla="val 35833"/>
-            </a:avLst>
-          </a:prstGeom>
-          <a:ln w="38100"/>
-        </p:spPr>
-        <p:style>
-          <a:lnRef idx="2">
-            <a:schemeClr val="accent5"/>
-          </a:lnRef>
-          <a:fillRef idx="1">
-            <a:schemeClr val="lt1"/>
-          </a:fillRef>
-          <a:effectRef idx="0">
-            <a:schemeClr val="accent5"/>
-          </a:effectRef>
-          <a:fontRef idx="minor">
-            <a:schemeClr val="dk1"/>
-          </a:fontRef>
-        </p:style>
-        <p:txBody>
-          <a:bodyPr lIns="0" tIns="0" rIns="0" bIns="36000" rtlCol="0" anchor="ctr">
-            <a:spAutoFit/>
-          </a:bodyPr>
-          <a:lstStyle/>
-          <a:p>
-            <a:pPr algn="ctr"/>
-            <a:r>
-              <a:rPr lang="en-US" sz="2000" noProof="1" smtClean="0"/>
-              <a:t>Pesho</a:t>
-            </a:r>
-            <a:endParaRPr lang="en-US" sz="2000" noProof="1"/>
-          </a:p>
-        </p:txBody>
-      </p:sp>
-      <p:cxnSp>
-        <p:nvCxnSpPr>
-          <p:cNvPr id="53" name="Straight Connector 9"/>
-          <p:cNvCxnSpPr>
-            <a:stCxn id="40" idx="1"/>
-            <a:endCxn id="41" idx="3"/>
-          </p:cNvCxnSpPr>
-          <p:nvPr/>
-        </p:nvCxnSpPr>
-        <p:spPr>
-          <a:xfrm flipH="1">
-            <a:off x="4653800" y="1107140"/>
-            <a:ext cx="396688" cy="0"/>
-          </a:xfrm>
-          <a:prstGeom prst="straightConnector1">
-            <a:avLst/>
-          </a:prstGeom>
-          <a:ln w="38100"/>
-        </p:spPr>
-        <p:style>
-          <a:lnRef idx="2">
-            <a:schemeClr val="accent5"/>
-          </a:lnRef>
-          <a:fillRef idx="1">
-            <a:schemeClr val="lt1"/>
-          </a:fillRef>
-          <a:effectRef idx="0">
-            <a:schemeClr val="accent5"/>
-          </a:effectRef>
-          <a:fontRef idx="minor">
-            <a:schemeClr val="dk1"/>
-          </a:fontRef>
-        </p:style>
-      </p:cxnSp>
-      <p:cxnSp>
-        <p:nvCxnSpPr>
-          <p:cNvPr id="54" name="Straight Arrow Connector 53"/>
-          <p:cNvCxnSpPr/>
-          <p:nvPr/>
-        </p:nvCxnSpPr>
-        <p:spPr>
-          <a:xfrm>
-            <a:off x="4666500" y="683004"/>
-            <a:ext cx="347089" cy="223126"/>
-          </a:xfrm>
-          <a:prstGeom prst="straightConnector1">
-            <a:avLst/>
-          </a:prstGeom>
           <a:ln w="38100">
             <a:solidFill>
               <a:schemeClr val="accent6">
                 <a:lumMod val="75000"/>
               </a:schemeClr>
             </a:solidFill>
-            <a:tailEnd type="triangle" w="lg" len="lg"/>
           </a:ln>
         </p:spPr>
         <p:style>
@@ -14056,110 +13861,31 @@
             <a:schemeClr val="dk1"/>
           </a:fontRef>
         </p:style>
-      </p:cxnSp>
-      <p:sp>
-        <p:nvSpPr>
-          <p:cNvPr id="55" name="Rounded Rectangle 54"/>
+        <p:txBody>
+          <a:bodyPr lIns="0" tIns="0" rIns="0" bIns="36000" rtlCol="0" anchor="ctr">
+            <a:spAutoFit/>
+          </a:bodyPr>
+          <a:lstStyle/>
+          <a:p>
+            <a:pPr algn="ctr"/>
+            <a:r>
+              <a:rPr lang="en-US" sz="2000" noProof="1" smtClean="0"/>
+              <a:t>Maria</a:t>
+            </a:r>
+            <a:endParaRPr lang="en-US" sz="2000" noProof="1"/>
+          </a:p>
+        </p:txBody>
+      </p:sp>
+      <p:sp>
+        <p:nvSpPr>
+          <p:cNvPr id="6" name="Rounded Rectangle 5"/>
           <p:cNvSpPr/>
           <p:nvPr/>
         </p:nvSpPr>
         <p:spPr>
           <a:xfrm>
-            <a:off x="8437733" y="890146"/>
-            <a:ext cx="874059" cy="433988"/>
-          </a:xfrm>
-          <a:prstGeom prst="roundRect">
-            <a:avLst>
-              <a:gd name="adj" fmla="val 35833"/>
-            </a:avLst>
-          </a:prstGeom>
-          <a:ln w="38100"/>
-        </p:spPr>
-        <p:style>
-          <a:lnRef idx="2">
-            <a:schemeClr val="accent5"/>
-          </a:lnRef>
-          <a:fillRef idx="1">
-            <a:schemeClr val="lt1"/>
-          </a:fillRef>
-          <a:effectRef idx="0">
-            <a:schemeClr val="accent5"/>
-          </a:effectRef>
-          <a:fontRef idx="minor">
-            <a:schemeClr val="dk1"/>
-          </a:fontRef>
-        </p:style>
-        <p:txBody>
-          <a:bodyPr lIns="0" tIns="0" rIns="0" bIns="36000" rtlCol="0" anchor="ctr">
-            <a:spAutoFit/>
-          </a:bodyPr>
-          <a:lstStyle/>
-          <a:p>
-            <a:pPr algn="ctr"/>
-            <a:r>
-              <a:rPr lang="en-US" sz="2000" noProof="1"/>
-              <a:t>Maria</a:t>
-            </a:r>
-          </a:p>
-        </p:txBody>
-      </p:sp>
-      <p:sp>
-        <p:nvSpPr>
-          <p:cNvPr id="56" name="Rounded Rectangle 55"/>
-          <p:cNvSpPr/>
-          <p:nvPr/>
-        </p:nvSpPr>
-        <p:spPr>
-          <a:xfrm>
-            <a:off x="7311544" y="890146"/>
+            <a:off x="3562108" y="2200334"/>
             <a:ext cx="729501" cy="433988"/>
-          </a:xfrm>
-          <a:prstGeom prst="roundRect">
-            <a:avLst>
-              <a:gd name="adj" fmla="val 35833"/>
-            </a:avLst>
-          </a:prstGeom>
-          <a:ln w="38100"/>
-        </p:spPr>
-        <p:style>
-          <a:lnRef idx="2">
-            <a:schemeClr val="accent5"/>
-          </a:lnRef>
-          <a:fillRef idx="1">
-            <a:schemeClr val="lt1"/>
-          </a:fillRef>
-          <a:effectRef idx="0">
-            <a:schemeClr val="accent5"/>
-          </a:effectRef>
-          <a:fontRef idx="minor">
-            <a:schemeClr val="dk1"/>
-          </a:fontRef>
-        </p:style>
-        <p:txBody>
-          <a:bodyPr lIns="0" tIns="0" rIns="0" bIns="36000" rtlCol="0" anchor="ctr">
-            <a:spAutoFit/>
-          </a:bodyPr>
-          <a:lstStyle/>
-          <a:p>
-            <a:pPr algn="ctr"/>
-            <a:r>
-              <a:rPr lang="en-US" sz="2000" noProof="1" smtClean="0"/>
-              <a:t>Ivan</a:t>
-            </a:r>
-            <a:endParaRPr lang="en-US" sz="2000" noProof="1"/>
-          </a:p>
-        </p:txBody>
-      </p:sp>
-      <p:sp>
-        <p:nvSpPr>
-          <p:cNvPr id="57" name="Rounded Rectangle 56"/>
-          <p:cNvSpPr/>
-          <p:nvPr/>
-        </p:nvSpPr>
-        <p:spPr>
-          <a:xfrm>
-            <a:off x="8029465" y="1553828"/>
-            <a:ext cx="1051035" cy="433988"/>
           </a:xfrm>
           <a:prstGeom prst="roundRect">
             <a:avLst>
@@ -14172,92 +13898,12 @@
               <a:lumOff val="80000"/>
             </a:schemeClr>
           </a:solidFill>
-          <a:ln w="38100"/>
-        </p:spPr>
-        <p:style>
-          <a:lnRef idx="2">
-            <a:schemeClr val="accent5"/>
-          </a:lnRef>
-          <a:fillRef idx="1">
-            <a:schemeClr val="lt1"/>
-          </a:fillRef>
-          <a:effectRef idx="0">
-            <a:schemeClr val="accent5"/>
-          </a:effectRef>
-          <a:fontRef idx="minor">
-            <a:schemeClr val="dk1"/>
-          </a:fontRef>
-        </p:style>
-        <p:txBody>
-          <a:bodyPr lIns="0" tIns="0" rIns="0" bIns="36000" rtlCol="0" anchor="ctr">
-            <a:spAutoFit/>
-          </a:bodyPr>
-          <a:lstStyle/>
-          <a:p>
-            <a:pPr algn="ctr"/>
-            <a:r>
-              <a:rPr lang="en-US" sz="2000" noProof="1" smtClean="0"/>
-              <a:t>Pesho2</a:t>
-            </a:r>
-            <a:endParaRPr lang="en-US" sz="2000" noProof="1"/>
-          </a:p>
-        </p:txBody>
-      </p:sp>
-      <p:cxnSp>
-        <p:nvCxnSpPr>
-          <p:cNvPr id="58" name="Straight Connector 9"/>
-          <p:cNvCxnSpPr>
-            <a:stCxn id="55" idx="1"/>
-            <a:endCxn id="56" idx="3"/>
-          </p:cNvCxnSpPr>
-          <p:nvPr/>
-        </p:nvCxnSpPr>
-        <p:spPr>
-          <a:xfrm flipH="1">
-            <a:off x="8041045" y="1107140"/>
-            <a:ext cx="396688" cy="0"/>
-          </a:xfrm>
-          <a:prstGeom prst="straightConnector1">
-            <a:avLst/>
-          </a:prstGeom>
-          <a:ln w="38100"/>
-        </p:spPr>
-        <p:style>
-          <a:lnRef idx="2">
-            <a:schemeClr val="accent5"/>
-          </a:lnRef>
-          <a:fillRef idx="1">
-            <a:schemeClr val="lt1"/>
-          </a:fillRef>
-          <a:effectRef idx="0">
-            <a:schemeClr val="accent5"/>
-          </a:effectRef>
-          <a:fontRef idx="minor">
-            <a:schemeClr val="dk1"/>
-          </a:fontRef>
-        </p:style>
-      </p:cxnSp>
-      <p:cxnSp>
-        <p:nvCxnSpPr>
-          <p:cNvPr id="59" name="Straight Arrow Connector 58"/>
-          <p:cNvCxnSpPr/>
-          <p:nvPr/>
-        </p:nvCxnSpPr>
-        <p:spPr>
-          <a:xfrm>
-            <a:off x="7472561" y="1625587"/>
-            <a:ext cx="457733" cy="111563"/>
-          </a:xfrm>
-          <a:prstGeom prst="straightConnector1">
-            <a:avLst/>
-          </a:prstGeom>
           <a:ln w="38100">
             <a:solidFill>
               <a:schemeClr val="accent6">
                 <a:lumMod val="75000"/>
               </a:schemeClr>
             </a:solidFill>
-            <a:tailEnd type="triangle" w="lg" len="lg"/>
           </a:ln>
         </p:spPr>
         <p:style>
@@ -14274,17 +13920,31 @@
             <a:schemeClr val="dk1"/>
           </a:fontRef>
         </p:style>
-      </p:cxnSp>
-      <p:sp>
-        <p:nvSpPr>
-          <p:cNvPr id="60" name="Rounded Rectangle 59"/>
+        <p:txBody>
+          <a:bodyPr lIns="0" tIns="0" rIns="0" bIns="36000" rtlCol="0" anchor="ctr">
+            <a:spAutoFit/>
+          </a:bodyPr>
+          <a:lstStyle/>
+          <a:p>
+            <a:pPr algn="ctr"/>
+            <a:r>
+              <a:rPr lang="en-US" sz="2000" noProof="1" smtClean="0"/>
+              <a:t>Ivan</a:t>
+            </a:r>
+            <a:endParaRPr lang="en-US" sz="2000" noProof="1"/>
+          </a:p>
+        </p:txBody>
+      </p:sp>
+      <p:sp>
+        <p:nvSpPr>
+          <p:cNvPr id="7" name="Rounded Rectangle 6"/>
           <p:cNvSpPr/>
           <p:nvPr/>
         </p:nvSpPr>
         <p:spPr>
           <a:xfrm>
-            <a:off x="4784908" y="4027046"/>
-            <a:ext cx="874059" cy="433988"/>
+            <a:off x="410873" y="2200335"/>
+            <a:ext cx="927847" cy="433988"/>
           </a:xfrm>
           <a:prstGeom prst="roundRect">
             <a:avLst>
@@ -14297,7 +13957,13 @@
               <a:lumOff val="80000"/>
             </a:schemeClr>
           </a:solidFill>
-          <a:ln w="38100"/>
+          <a:ln w="38100">
+            <a:solidFill>
+              <a:schemeClr val="accent6">
+                <a:lumMod val="75000"/>
+              </a:schemeClr>
+            </a:solidFill>
+          </a:ln>
         </p:spPr>
         <p:style>
           <a:lnRef idx="2">
@@ -14321,22 +13987,23 @@
           <a:p>
             <a:pPr algn="ctr"/>
             <a:r>
-              <a:rPr lang="en-US" sz="2000" noProof="1"/>
-              <a:t>Maria</a:t>
-            </a:r>
-          </a:p>
-        </p:txBody>
-      </p:sp>
-      <p:sp>
-        <p:nvSpPr>
-          <p:cNvPr id="61" name="Rounded Rectangle 60"/>
+              <a:rPr lang="en-US" sz="2000" noProof="1" smtClean="0"/>
+              <a:t>Pesho</a:t>
+            </a:r>
+            <a:endParaRPr lang="en-US" sz="2000" noProof="1"/>
+          </a:p>
+        </p:txBody>
+      </p:sp>
+      <p:sp>
+        <p:nvSpPr>
+          <p:cNvPr id="42" name="Rounded Rectangle 41"/>
           <p:cNvSpPr/>
           <p:nvPr/>
         </p:nvSpPr>
         <p:spPr>
           <a:xfrm>
-            <a:off x="3658719" y="4027046"/>
-            <a:ext cx="729501" cy="433988"/>
+            <a:off x="1838131" y="2425201"/>
+            <a:ext cx="1108425" cy="433988"/>
           </a:xfrm>
           <a:prstGeom prst="roundRect">
             <a:avLst>
@@ -14349,46 +14016,53 @@
               <a:lumOff val="80000"/>
             </a:schemeClr>
           </a:solidFill>
-          <a:ln w="38100"/>
-        </p:spPr>
-        <p:style>
-          <a:lnRef idx="2">
-            <a:schemeClr val="accent5"/>
-          </a:lnRef>
-          <a:fillRef idx="1">
-            <a:schemeClr val="lt1"/>
-          </a:fillRef>
-          <a:effectRef idx="0">
-            <a:schemeClr val="accent5"/>
-          </a:effectRef>
-          <a:fontRef idx="minor">
-            <a:schemeClr val="dk1"/>
-          </a:fontRef>
-        </p:style>
-        <p:txBody>
-          <a:bodyPr lIns="0" tIns="0" rIns="0" bIns="36000" rtlCol="0" anchor="ctr">
+          <a:ln w="38100">
+            <a:solidFill>
+              <a:schemeClr val="accent6">
+                <a:lumMod val="75000"/>
+              </a:schemeClr>
+            </a:solidFill>
+          </a:ln>
+        </p:spPr>
+        <p:style>
+          <a:lnRef idx="2">
+            <a:schemeClr val="accent5"/>
+          </a:lnRef>
+          <a:fillRef idx="1">
+            <a:schemeClr val="lt1"/>
+          </a:fillRef>
+          <a:effectRef idx="0">
+            <a:schemeClr val="accent5"/>
+          </a:effectRef>
+          <a:fontRef idx="minor">
+            <a:schemeClr val="dk1"/>
+          </a:fontRef>
+        </p:style>
+        <p:txBody>
+          <a:bodyPr wrap="square" lIns="0" tIns="0" rIns="0" bIns="36000" rtlCol="0" anchor="ctr">
             <a:spAutoFit/>
           </a:bodyPr>
           <a:lstStyle/>
           <a:p>
             <a:pPr algn="ctr"/>
             <a:r>
-              <a:rPr lang="en-US" sz="2000" noProof="1"/>
-              <a:t>Ivan</a:t>
-            </a:r>
-          </a:p>
-        </p:txBody>
-      </p:sp>
-      <p:sp>
-        <p:nvSpPr>
-          <p:cNvPr id="62" name="Rounded Rectangle 61"/>
+              <a:rPr lang="en-US" sz="2000" noProof="1" smtClean="0"/>
+              <a:t>Doncho</a:t>
+            </a:r>
+            <a:endParaRPr lang="en-US" sz="2000" noProof="1"/>
+          </a:p>
+        </p:txBody>
+      </p:sp>
+      <p:sp>
+        <p:nvSpPr>
+          <p:cNvPr id="30" name="Rounded Rectangle 29"/>
           <p:cNvSpPr/>
           <p:nvPr/>
         </p:nvSpPr>
         <p:spPr>
           <a:xfrm>
-            <a:off x="4351240" y="4690728"/>
-            <a:ext cx="927847" cy="433988"/>
+            <a:off x="2513381" y="4110961"/>
+            <a:ext cx="866350" cy="433988"/>
           </a:xfrm>
           <a:prstGeom prst="roundRect">
             <a:avLst>
@@ -14401,91 +14075,12 @@
               <a:lumOff val="80000"/>
             </a:schemeClr>
           </a:solidFill>
-          <a:ln w="38100"/>
-        </p:spPr>
-        <p:style>
-          <a:lnRef idx="2">
-            <a:schemeClr val="accent5"/>
-          </a:lnRef>
-          <a:fillRef idx="1">
-            <a:schemeClr val="lt1"/>
-          </a:fillRef>
-          <a:effectRef idx="0">
-            <a:schemeClr val="accent5"/>
-          </a:effectRef>
-          <a:fontRef idx="minor">
-            <a:schemeClr val="dk1"/>
-          </a:fontRef>
-        </p:style>
-        <p:txBody>
-          <a:bodyPr lIns="0" tIns="0" rIns="0" bIns="36000" rtlCol="0" anchor="ctr">
-            <a:spAutoFit/>
-          </a:bodyPr>
-          <a:lstStyle/>
-          <a:p>
-            <a:pPr algn="ctr"/>
-            <a:r>
-              <a:rPr lang="en-US" sz="2000" noProof="1"/>
-              <a:t>Pesho</a:t>
-            </a:r>
-          </a:p>
-        </p:txBody>
-      </p:sp>
-      <p:cxnSp>
-        <p:nvCxnSpPr>
-          <p:cNvPr id="63" name="Straight Connector 9"/>
-          <p:cNvCxnSpPr>
-            <a:stCxn id="60" idx="1"/>
-            <a:endCxn id="61" idx="3"/>
-          </p:cNvCxnSpPr>
-          <p:nvPr/>
-        </p:nvCxnSpPr>
-        <p:spPr>
-          <a:xfrm flipH="1">
-            <a:off x="4388220" y="4244040"/>
-            <a:ext cx="396688" cy="0"/>
-          </a:xfrm>
-          <a:prstGeom prst="straightConnector1">
-            <a:avLst/>
-          </a:prstGeom>
-          <a:ln w="38100"/>
-        </p:spPr>
-        <p:style>
-          <a:lnRef idx="2">
-            <a:schemeClr val="accent5"/>
-          </a:lnRef>
-          <a:fillRef idx="1">
-            <a:schemeClr val="lt1"/>
-          </a:fillRef>
-          <a:effectRef idx="0">
-            <a:schemeClr val="accent5"/>
-          </a:effectRef>
-          <a:fontRef idx="minor">
-            <a:schemeClr val="dk1"/>
-          </a:fontRef>
-        </p:style>
-      </p:cxnSp>
-      <p:cxnSp>
-        <p:nvCxnSpPr>
-          <p:cNvPr id="64" name="Straight Arrow Connector 63"/>
-          <p:cNvCxnSpPr/>
-          <p:nvPr/>
-        </p:nvCxnSpPr>
-        <p:spPr>
-          <a:xfrm>
-            <a:off x="3794336" y="4762487"/>
-            <a:ext cx="457733" cy="111563"/>
-          </a:xfrm>
-          <a:prstGeom prst="straightConnector1">
-            <a:avLst/>
-          </a:prstGeom>
           <a:ln w="38100">
             <a:solidFill>
               <a:schemeClr val="accent6">
                 <a:lumMod val="75000"/>
               </a:schemeClr>
             </a:solidFill>
-            <a:tailEnd type="triangle" w="lg" len="lg"/>
           </a:ln>
         </p:spPr>
         <p:style>
@@ -14502,28 +14097,49 @@
             <a:schemeClr val="dk1"/>
           </a:fontRef>
         </p:style>
-      </p:cxnSp>
-      <p:cxnSp>
-        <p:nvCxnSpPr>
-          <p:cNvPr id="65" name="Straight Arrow Connector 64"/>
-          <p:cNvCxnSpPr/>
-          <p:nvPr/>
-        </p:nvCxnSpPr>
-        <p:spPr>
-          <a:xfrm>
-            <a:off x="3784600" y="3657600"/>
-            <a:ext cx="238602" cy="274511"/>
-          </a:xfrm>
-          <a:prstGeom prst="straightConnector1">
-            <a:avLst/>
-          </a:prstGeom>
+        <p:txBody>
+          <a:bodyPr wrap="square" lIns="0" tIns="0" rIns="0" bIns="36000" rtlCol="0" anchor="ctr">
+            <a:spAutoFit/>
+          </a:bodyPr>
+          <a:lstStyle/>
+          <a:p>
+            <a:pPr algn="ctr"/>
+            <a:r>
+              <a:rPr lang="en-US" sz="2000" noProof="1" smtClean="0"/>
+              <a:t>Gosho</a:t>
+            </a:r>
+            <a:endParaRPr lang="en-US" sz="2000" noProof="1"/>
+          </a:p>
+        </p:txBody>
+      </p:sp>
+      <p:sp>
+        <p:nvSpPr>
+          <p:cNvPr id="31" name="Rounded Rectangle 30"/>
+          <p:cNvSpPr/>
+          <p:nvPr/>
+        </p:nvSpPr>
+        <p:spPr>
+          <a:xfrm>
+            <a:off x="1308507" y="4110417"/>
+            <a:ext cx="818873" cy="433988"/>
+          </a:xfrm>
+          <a:prstGeom prst="roundRect">
+            <a:avLst>
+              <a:gd name="adj" fmla="val 35833"/>
+            </a:avLst>
+          </a:prstGeom>
+          <a:solidFill>
+            <a:schemeClr val="accent6">
+              <a:lumMod val="20000"/>
+              <a:lumOff val="80000"/>
+            </a:schemeClr>
+          </a:solidFill>
           <a:ln w="38100">
             <a:solidFill>
               <a:schemeClr val="accent6">
                 <a:lumMod val="75000"/>
               </a:schemeClr>
             </a:solidFill>
-            <a:tailEnd type="triangle" w="lg" len="lg"/>
           </a:ln>
         </p:spPr>
         <p:style>
@@ -14538,30 +14154,247 @@
           </a:effectRef>
           <a:fontRef idx="minor">
             <a:schemeClr val="dk1"/>
+          </a:fontRef>
+        </p:style>
+        <p:txBody>
+          <a:bodyPr wrap="square" lIns="0" tIns="0" rIns="0" bIns="36000" rtlCol="0" anchor="ctr">
+            <a:spAutoFit/>
+          </a:bodyPr>
+          <a:lstStyle/>
+          <a:p>
+            <a:pPr algn="ctr"/>
+            <a:r>
+              <a:rPr lang="en-US" sz="2000" noProof="1" smtClean="0"/>
+              <a:t>Penka</a:t>
+            </a:r>
+            <a:endParaRPr lang="en-US" sz="2000" noProof="1"/>
+          </a:p>
+        </p:txBody>
+      </p:sp>
+      <p:cxnSp>
+        <p:nvCxnSpPr>
+          <p:cNvPr id="20" name="Straight Connector 19"/>
+          <p:cNvCxnSpPr>
+            <a:stCxn id="4" idx="1"/>
+            <a:endCxn id="7" idx="0"/>
+          </p:cNvCxnSpPr>
+          <p:nvPr/>
+        </p:nvCxnSpPr>
+        <p:spPr>
+          <a:xfrm rot="10800000" flipV="1">
+            <a:off x="874797" y="884551"/>
+            <a:ext cx="1049048" cy="1315783"/>
+          </a:xfrm>
+          <a:prstGeom prst="curvedConnector2">
+            <a:avLst/>
+          </a:prstGeom>
+          <a:ln w="31750">
+            <a:solidFill>
+              <a:srgbClr val="C00000"/>
+            </a:solidFill>
+          </a:ln>
+        </p:spPr>
+        <p:style>
+          <a:lnRef idx="1">
+            <a:schemeClr val="accent1"/>
+          </a:lnRef>
+          <a:fillRef idx="0">
+            <a:schemeClr val="accent1"/>
+          </a:fillRef>
+          <a:effectRef idx="0">
+            <a:schemeClr val="accent1"/>
+          </a:effectRef>
+          <a:fontRef idx="minor">
+            <a:schemeClr val="tx1"/>
           </a:fontRef>
         </p:style>
       </p:cxnSp>
       <p:cxnSp>
         <p:nvCxnSpPr>
-          <p:cNvPr id="66" name="Straight Arrow Connector 65"/>
-          <p:cNvCxnSpPr/>
+          <p:cNvPr id="28" name="Straight Connector 27"/>
+          <p:cNvCxnSpPr>
+            <a:stCxn id="4" idx="3"/>
+            <a:endCxn id="6" idx="0"/>
+          </p:cNvCxnSpPr>
           <p:nvPr/>
         </p:nvCxnSpPr>
         <p:spPr>
           <a:xfrm>
-            <a:off x="4877688" y="3672797"/>
-            <a:ext cx="238602" cy="274511"/>
-          </a:xfrm>
-          <a:prstGeom prst="straightConnector1">
-            <a:avLst/>
-          </a:prstGeom>
+            <a:off x="2797904" y="884552"/>
+            <a:ext cx="1128955" cy="1315782"/>
+          </a:xfrm>
+          <a:prstGeom prst="curvedConnector2">
+            <a:avLst/>
+          </a:prstGeom>
+          <a:ln w="31750">
+            <a:solidFill>
+              <a:schemeClr val="accent6">
+                <a:lumMod val="75000"/>
+              </a:schemeClr>
+            </a:solidFill>
+          </a:ln>
+        </p:spPr>
+        <p:style>
+          <a:lnRef idx="1">
+            <a:schemeClr val="accent1"/>
+          </a:lnRef>
+          <a:fillRef idx="0">
+            <a:schemeClr val="accent1"/>
+          </a:fillRef>
+          <a:effectRef idx="0">
+            <a:schemeClr val="accent1"/>
+          </a:effectRef>
+          <a:fontRef idx="minor">
+            <a:schemeClr val="tx1"/>
+          </a:fontRef>
+        </p:style>
+      </p:cxnSp>
+      <p:cxnSp>
+        <p:nvCxnSpPr>
+          <p:cNvPr id="33" name="Straight Connector 32"/>
+          <p:cNvCxnSpPr>
+            <a:stCxn id="7" idx="2"/>
+            <a:endCxn id="31" idx="1"/>
+          </p:cNvCxnSpPr>
+          <p:nvPr/>
+        </p:nvCxnSpPr>
+        <p:spPr>
+          <a:xfrm rot="16200000" flipH="1">
+            <a:off x="245108" y="3264012"/>
+            <a:ext cx="1693088" cy="433710"/>
+          </a:xfrm>
+          <a:prstGeom prst="curvedConnector2">
+            <a:avLst/>
+          </a:prstGeom>
+          <a:ln w="31750">
+            <a:solidFill>
+              <a:schemeClr val="accent6">
+                <a:lumMod val="75000"/>
+              </a:schemeClr>
+            </a:solidFill>
+          </a:ln>
+        </p:spPr>
+        <p:style>
+          <a:lnRef idx="1">
+            <a:schemeClr val="accent1"/>
+          </a:lnRef>
+          <a:fillRef idx="0">
+            <a:schemeClr val="accent1"/>
+          </a:fillRef>
+          <a:effectRef idx="0">
+            <a:schemeClr val="accent1"/>
+          </a:effectRef>
+          <a:fontRef idx="minor">
+            <a:schemeClr val="tx1"/>
+          </a:fontRef>
+        </p:style>
+      </p:cxnSp>
+      <p:cxnSp>
+        <p:nvCxnSpPr>
+          <p:cNvPr id="37" name="Straight Connector 36"/>
+          <p:cNvCxnSpPr>
+            <a:stCxn id="31" idx="3"/>
+            <a:endCxn id="30" idx="1"/>
+          </p:cNvCxnSpPr>
+          <p:nvPr/>
+        </p:nvCxnSpPr>
+        <p:spPr>
+          <a:xfrm>
+            <a:off x="2127380" y="4327411"/>
+            <a:ext cx="386001" cy="544"/>
+          </a:xfrm>
+          <a:prstGeom prst="curvedConnector3">
+            <a:avLst>
+              <a:gd name="adj1" fmla="val 50000"/>
+            </a:avLst>
+          </a:prstGeom>
+          <a:ln w="31750">
+            <a:solidFill>
+              <a:srgbClr val="C00000"/>
+            </a:solidFill>
+          </a:ln>
+        </p:spPr>
+        <p:style>
+          <a:lnRef idx="1">
+            <a:schemeClr val="accent1"/>
+          </a:lnRef>
+          <a:fillRef idx="0">
+            <a:schemeClr val="accent1"/>
+          </a:fillRef>
+          <a:effectRef idx="0">
+            <a:schemeClr val="accent1"/>
+          </a:effectRef>
+          <a:fontRef idx="minor">
+            <a:schemeClr val="tx1"/>
+          </a:fontRef>
+        </p:style>
+      </p:cxnSp>
+      <p:cxnSp>
+        <p:nvCxnSpPr>
+          <p:cNvPr id="44" name="Straight Connector 43"/>
+          <p:cNvCxnSpPr>
+            <a:stCxn id="6" idx="2"/>
+            <a:endCxn id="30" idx="3"/>
+          </p:cNvCxnSpPr>
+          <p:nvPr/>
+        </p:nvCxnSpPr>
+        <p:spPr>
+          <a:xfrm rot="5400000">
+            <a:off x="2806479" y="3207574"/>
+            <a:ext cx="1693633" cy="547128"/>
+          </a:xfrm>
+          <a:prstGeom prst="curvedConnector2">
+            <a:avLst/>
+          </a:prstGeom>
+          <a:ln w="31750">
+            <a:solidFill>
+              <a:srgbClr val="C00000"/>
+            </a:solidFill>
+          </a:ln>
+        </p:spPr>
+        <p:style>
+          <a:lnRef idx="1">
+            <a:schemeClr val="accent1"/>
+          </a:lnRef>
+          <a:fillRef idx="0">
+            <a:schemeClr val="accent1"/>
+          </a:fillRef>
+          <a:effectRef idx="0">
+            <a:schemeClr val="accent1"/>
+          </a:effectRef>
+          <a:fontRef idx="minor">
+            <a:schemeClr val="tx1"/>
+          </a:fontRef>
+        </p:style>
+      </p:cxnSp>
+      <p:sp>
+        <p:nvSpPr>
+          <p:cNvPr id="81" name="Rounded Rectangle 80"/>
+          <p:cNvSpPr/>
+          <p:nvPr/>
+        </p:nvSpPr>
+        <p:spPr>
+          <a:xfrm>
+            <a:off x="1923845" y="3215830"/>
+            <a:ext cx="927847" cy="433988"/>
+          </a:xfrm>
+          <a:prstGeom prst="roundRect">
+            <a:avLst>
+              <a:gd name="adj" fmla="val 35833"/>
+            </a:avLst>
+          </a:prstGeom>
+          <a:solidFill>
+            <a:schemeClr val="accent6">
+              <a:lumMod val="20000"/>
+              <a:lumOff val="80000"/>
+            </a:schemeClr>
+          </a:solidFill>
           <a:ln w="38100">
             <a:solidFill>
               <a:schemeClr val="accent6">
                 <a:lumMod val="75000"/>
               </a:schemeClr>
             </a:solidFill>
-            <a:tailEnd type="triangle" w="lg" len="lg"/>
           </a:ln>
         </p:spPr>
         <p:style>
@@ -14576,6 +14409,987 @@
           </a:effectRef>
           <a:fontRef idx="minor">
             <a:schemeClr val="dk1"/>
+          </a:fontRef>
+        </p:style>
+        <p:txBody>
+          <a:bodyPr lIns="0" tIns="0" rIns="0" bIns="36000" rtlCol="0" anchor="ctr">
+            <a:spAutoFit/>
+          </a:bodyPr>
+          <a:lstStyle/>
+          <a:p>
+            <a:pPr algn="ctr"/>
+            <a:r>
+              <a:rPr lang="en-US" sz="2000" noProof="1" smtClean="0"/>
+              <a:t>Kiril</a:t>
+            </a:r>
+            <a:endParaRPr lang="en-US" sz="2000" noProof="1"/>
+          </a:p>
+        </p:txBody>
+      </p:sp>
+      <p:sp>
+        <p:nvSpPr>
+          <p:cNvPr id="82" name="Rounded Rectangle 81"/>
+          <p:cNvSpPr/>
+          <p:nvPr/>
+        </p:nvSpPr>
+        <p:spPr>
+          <a:xfrm>
+            <a:off x="1923844" y="1625587"/>
+            <a:ext cx="927847" cy="433988"/>
+          </a:xfrm>
+          <a:prstGeom prst="roundRect">
+            <a:avLst>
+              <a:gd name="adj" fmla="val 35833"/>
+            </a:avLst>
+          </a:prstGeom>
+          <a:solidFill>
+            <a:schemeClr val="accent6">
+              <a:lumMod val="20000"/>
+              <a:lumOff val="80000"/>
+            </a:schemeClr>
+          </a:solidFill>
+          <a:ln w="38100">
+            <a:solidFill>
+              <a:schemeClr val="accent6">
+                <a:lumMod val="75000"/>
+              </a:schemeClr>
+            </a:solidFill>
+          </a:ln>
+        </p:spPr>
+        <p:style>
+          <a:lnRef idx="2">
+            <a:schemeClr val="accent5"/>
+          </a:lnRef>
+          <a:fillRef idx="1">
+            <a:schemeClr val="lt1"/>
+          </a:fillRef>
+          <a:effectRef idx="0">
+            <a:schemeClr val="accent5"/>
+          </a:effectRef>
+          <a:fontRef idx="minor">
+            <a:schemeClr val="dk1"/>
+          </a:fontRef>
+        </p:style>
+        <p:txBody>
+          <a:bodyPr lIns="0" tIns="0" rIns="0" bIns="36000" rtlCol="0" anchor="ctr">
+            <a:spAutoFit/>
+          </a:bodyPr>
+          <a:lstStyle/>
+          <a:p>
+            <a:pPr algn="ctr"/>
+            <a:r>
+              <a:rPr lang="en-US" sz="2000" noProof="1" smtClean="0"/>
+              <a:t>Asen</a:t>
+            </a:r>
+            <a:endParaRPr lang="en-US" sz="2000" noProof="1"/>
+          </a:p>
+        </p:txBody>
+      </p:sp>
+      <p:cxnSp>
+        <p:nvCxnSpPr>
+          <p:cNvPr id="84" name="Straight Connector 83"/>
+          <p:cNvCxnSpPr>
+            <a:stCxn id="30" idx="0"/>
+            <a:endCxn id="81" idx="2"/>
+          </p:cNvCxnSpPr>
+          <p:nvPr/>
+        </p:nvCxnSpPr>
+        <p:spPr>
+          <a:xfrm rot="16200000" flipV="1">
+            <a:off x="2436592" y="3600996"/>
+            <a:ext cx="461143" cy="558787"/>
+          </a:xfrm>
+          <a:prstGeom prst="curvedConnector3">
+            <a:avLst>
+              <a:gd name="adj1" fmla="val 50000"/>
+            </a:avLst>
+          </a:prstGeom>
+          <a:ln w="31750">
+            <a:solidFill>
+              <a:schemeClr val="accent6">
+                <a:lumMod val="75000"/>
+              </a:schemeClr>
+            </a:solidFill>
+          </a:ln>
+        </p:spPr>
+        <p:style>
+          <a:lnRef idx="1">
+            <a:schemeClr val="accent1"/>
+          </a:lnRef>
+          <a:fillRef idx="0">
+            <a:schemeClr val="accent1"/>
+          </a:fillRef>
+          <a:effectRef idx="0">
+            <a:schemeClr val="accent1"/>
+          </a:effectRef>
+          <a:fontRef idx="minor">
+            <a:schemeClr val="tx1"/>
+          </a:fontRef>
+        </p:style>
+      </p:cxnSp>
+      <p:cxnSp>
+        <p:nvCxnSpPr>
+          <p:cNvPr id="86" name="Straight Connector 85"/>
+          <p:cNvCxnSpPr>
+            <a:stCxn id="81" idx="0"/>
+            <a:endCxn id="42" idx="2"/>
+          </p:cNvCxnSpPr>
+          <p:nvPr/>
+        </p:nvCxnSpPr>
+        <p:spPr>
+          <a:xfrm flipV="1">
+            <a:off x="2387769" y="2859189"/>
+            <a:ext cx="4575" cy="356641"/>
+          </a:xfrm>
+          <a:prstGeom prst="line">
+            <a:avLst/>
+          </a:prstGeom>
+          <a:ln w="31750">
+            <a:solidFill>
+              <a:srgbClr val="C00000"/>
+            </a:solidFill>
+          </a:ln>
+        </p:spPr>
+        <p:style>
+          <a:lnRef idx="1">
+            <a:schemeClr val="accent1"/>
+          </a:lnRef>
+          <a:fillRef idx="0">
+            <a:schemeClr val="accent1"/>
+          </a:fillRef>
+          <a:effectRef idx="0">
+            <a:schemeClr val="accent1"/>
+          </a:effectRef>
+          <a:fontRef idx="minor">
+            <a:schemeClr val="tx1"/>
+          </a:fontRef>
+        </p:style>
+      </p:cxnSp>
+      <p:cxnSp>
+        <p:nvCxnSpPr>
+          <p:cNvPr id="88" name="Straight Connector 87"/>
+          <p:cNvCxnSpPr>
+            <a:stCxn id="42" idx="0"/>
+            <a:endCxn id="82" idx="2"/>
+          </p:cNvCxnSpPr>
+          <p:nvPr/>
+        </p:nvCxnSpPr>
+        <p:spPr>
+          <a:xfrm flipH="1" flipV="1">
+            <a:off x="2387768" y="2059575"/>
+            <a:ext cx="4576" cy="365626"/>
+          </a:xfrm>
+          <a:prstGeom prst="line">
+            <a:avLst/>
+          </a:prstGeom>
+          <a:ln w="31750">
+            <a:solidFill>
+              <a:schemeClr val="accent6">
+                <a:lumMod val="75000"/>
+              </a:schemeClr>
+            </a:solidFill>
+          </a:ln>
+        </p:spPr>
+        <p:style>
+          <a:lnRef idx="1">
+            <a:schemeClr val="accent1"/>
+          </a:lnRef>
+          <a:fillRef idx="0">
+            <a:schemeClr val="accent1"/>
+          </a:fillRef>
+          <a:effectRef idx="0">
+            <a:schemeClr val="accent1"/>
+          </a:effectRef>
+          <a:fontRef idx="minor">
+            <a:schemeClr val="tx1"/>
+          </a:fontRef>
+        </p:style>
+      </p:cxnSp>
+      <p:sp>
+        <p:nvSpPr>
+          <p:cNvPr id="107" name="Rounded Rectangle 106"/>
+          <p:cNvSpPr/>
+          <p:nvPr/>
+        </p:nvSpPr>
+        <p:spPr>
+          <a:xfrm>
+            <a:off x="4800111" y="2059575"/>
+            <a:ext cx="874059" cy="433988"/>
+          </a:xfrm>
+          <a:prstGeom prst="roundRect">
+            <a:avLst>
+              <a:gd name="adj" fmla="val 35833"/>
+            </a:avLst>
+          </a:prstGeom>
+          <a:solidFill>
+            <a:schemeClr val="accent6">
+              <a:lumMod val="20000"/>
+              <a:lumOff val="80000"/>
+            </a:schemeClr>
+          </a:solidFill>
+          <a:ln w="38100">
+            <a:solidFill>
+              <a:schemeClr val="accent6">
+                <a:lumMod val="75000"/>
+              </a:schemeClr>
+            </a:solidFill>
+          </a:ln>
+        </p:spPr>
+        <p:style>
+          <a:lnRef idx="2">
+            <a:schemeClr val="accent5"/>
+          </a:lnRef>
+          <a:fillRef idx="1">
+            <a:schemeClr val="lt1"/>
+          </a:fillRef>
+          <a:effectRef idx="0">
+            <a:schemeClr val="accent5"/>
+          </a:effectRef>
+          <a:fontRef idx="minor">
+            <a:schemeClr val="dk1"/>
+          </a:fontRef>
+        </p:style>
+        <p:txBody>
+          <a:bodyPr lIns="0" tIns="0" rIns="0" bIns="36000" rtlCol="0" anchor="ctr">
+            <a:spAutoFit/>
+          </a:bodyPr>
+          <a:lstStyle/>
+          <a:p>
+            <a:pPr algn="ctr"/>
+            <a:r>
+              <a:rPr lang="en-US" sz="2000" noProof="1" smtClean="0"/>
+              <a:t>Maria</a:t>
+            </a:r>
+            <a:endParaRPr lang="en-US" sz="2000" noProof="1"/>
+          </a:p>
+        </p:txBody>
+      </p:sp>
+      <p:sp>
+        <p:nvSpPr>
+          <p:cNvPr id="108" name="Rounded Rectangle 107"/>
+          <p:cNvSpPr/>
+          <p:nvPr/>
+        </p:nvSpPr>
+        <p:spPr>
+          <a:xfrm>
+            <a:off x="6030791" y="1328340"/>
+            <a:ext cx="729501" cy="433988"/>
+          </a:xfrm>
+          <a:prstGeom prst="roundRect">
+            <a:avLst>
+              <a:gd name="adj" fmla="val 35833"/>
+            </a:avLst>
+          </a:prstGeom>
+          <a:solidFill>
+            <a:schemeClr val="accent6">
+              <a:lumMod val="20000"/>
+              <a:lumOff val="80000"/>
+            </a:schemeClr>
+          </a:solidFill>
+          <a:ln w="38100">
+            <a:solidFill>
+              <a:schemeClr val="accent6">
+                <a:lumMod val="75000"/>
+              </a:schemeClr>
+            </a:solidFill>
+          </a:ln>
+        </p:spPr>
+        <p:style>
+          <a:lnRef idx="2">
+            <a:schemeClr val="accent5"/>
+          </a:lnRef>
+          <a:fillRef idx="1">
+            <a:schemeClr val="lt1"/>
+          </a:fillRef>
+          <a:effectRef idx="0">
+            <a:schemeClr val="accent5"/>
+          </a:effectRef>
+          <a:fontRef idx="minor">
+            <a:schemeClr val="dk1"/>
+          </a:fontRef>
+        </p:style>
+        <p:txBody>
+          <a:bodyPr lIns="0" tIns="0" rIns="0" bIns="36000" rtlCol="0" anchor="ctr">
+            <a:spAutoFit/>
+          </a:bodyPr>
+          <a:lstStyle/>
+          <a:p>
+            <a:pPr algn="ctr"/>
+            <a:r>
+              <a:rPr lang="en-US" sz="2000" noProof="1" smtClean="0"/>
+              <a:t>Ivan</a:t>
+            </a:r>
+            <a:endParaRPr lang="en-US" sz="2000" noProof="1"/>
+          </a:p>
+        </p:txBody>
+      </p:sp>
+      <p:sp>
+        <p:nvSpPr>
+          <p:cNvPr id="109" name="Rounded Rectangle 108"/>
+          <p:cNvSpPr/>
+          <p:nvPr/>
+        </p:nvSpPr>
+        <p:spPr>
+          <a:xfrm>
+            <a:off x="5467695" y="2998484"/>
+            <a:ext cx="927847" cy="433988"/>
+          </a:xfrm>
+          <a:prstGeom prst="roundRect">
+            <a:avLst>
+              <a:gd name="adj" fmla="val 35833"/>
+            </a:avLst>
+          </a:prstGeom>
+          <a:solidFill>
+            <a:schemeClr val="accent6">
+              <a:lumMod val="20000"/>
+              <a:lumOff val="80000"/>
+            </a:schemeClr>
+          </a:solidFill>
+          <a:ln w="38100">
+            <a:solidFill>
+              <a:schemeClr val="accent6">
+                <a:lumMod val="75000"/>
+              </a:schemeClr>
+            </a:solidFill>
+          </a:ln>
+        </p:spPr>
+        <p:style>
+          <a:lnRef idx="2">
+            <a:schemeClr val="accent5"/>
+          </a:lnRef>
+          <a:fillRef idx="1">
+            <a:schemeClr val="lt1"/>
+          </a:fillRef>
+          <a:effectRef idx="0">
+            <a:schemeClr val="accent5"/>
+          </a:effectRef>
+          <a:fontRef idx="minor">
+            <a:schemeClr val="dk1"/>
+          </a:fontRef>
+        </p:style>
+        <p:txBody>
+          <a:bodyPr lIns="0" tIns="0" rIns="0" bIns="36000" rtlCol="0" anchor="ctr">
+            <a:spAutoFit/>
+          </a:bodyPr>
+          <a:lstStyle/>
+          <a:p>
+            <a:pPr algn="ctr"/>
+            <a:r>
+              <a:rPr lang="en-US" sz="2000" noProof="1" smtClean="0"/>
+              <a:t>Pesho</a:t>
+            </a:r>
+            <a:endParaRPr lang="en-US" sz="2000" noProof="1"/>
+          </a:p>
+        </p:txBody>
+      </p:sp>
+      <p:sp>
+        <p:nvSpPr>
+          <p:cNvPr id="110" name="Rounded Rectangle 109"/>
+          <p:cNvSpPr/>
+          <p:nvPr/>
+        </p:nvSpPr>
+        <p:spPr>
+          <a:xfrm>
+            <a:off x="9775511" y="2000912"/>
+            <a:ext cx="1108425" cy="433988"/>
+          </a:xfrm>
+          <a:prstGeom prst="roundRect">
+            <a:avLst>
+              <a:gd name="adj" fmla="val 35833"/>
+            </a:avLst>
+          </a:prstGeom>
+          <a:solidFill>
+            <a:schemeClr val="accent6">
+              <a:lumMod val="20000"/>
+              <a:lumOff val="80000"/>
+            </a:schemeClr>
+          </a:solidFill>
+          <a:ln w="38100">
+            <a:solidFill>
+              <a:schemeClr val="accent6">
+                <a:lumMod val="75000"/>
+              </a:schemeClr>
+            </a:solidFill>
+          </a:ln>
+        </p:spPr>
+        <p:style>
+          <a:lnRef idx="2">
+            <a:schemeClr val="accent5"/>
+          </a:lnRef>
+          <a:fillRef idx="1">
+            <a:schemeClr val="lt1"/>
+          </a:fillRef>
+          <a:effectRef idx="0">
+            <a:schemeClr val="accent5"/>
+          </a:effectRef>
+          <a:fontRef idx="minor">
+            <a:schemeClr val="dk1"/>
+          </a:fontRef>
+        </p:style>
+        <p:txBody>
+          <a:bodyPr wrap="square" lIns="0" tIns="0" rIns="0" bIns="36000" rtlCol="0" anchor="ctr">
+            <a:spAutoFit/>
+          </a:bodyPr>
+          <a:lstStyle/>
+          <a:p>
+            <a:pPr algn="ctr"/>
+            <a:r>
+              <a:rPr lang="en-US" sz="2000" noProof="1" smtClean="0"/>
+              <a:t>Doncho</a:t>
+            </a:r>
+            <a:endParaRPr lang="en-US" sz="2000" noProof="1"/>
+          </a:p>
+        </p:txBody>
+      </p:sp>
+      <p:sp>
+        <p:nvSpPr>
+          <p:cNvPr id="111" name="Rounded Rectangle 110"/>
+          <p:cNvSpPr/>
+          <p:nvPr/>
+        </p:nvSpPr>
+        <p:spPr>
+          <a:xfrm>
+            <a:off x="7167974" y="1991213"/>
+            <a:ext cx="866350" cy="433988"/>
+          </a:xfrm>
+          <a:prstGeom prst="roundRect">
+            <a:avLst>
+              <a:gd name="adj" fmla="val 35833"/>
+            </a:avLst>
+          </a:prstGeom>
+          <a:solidFill>
+            <a:schemeClr val="accent6">
+              <a:lumMod val="20000"/>
+              <a:lumOff val="80000"/>
+            </a:schemeClr>
+          </a:solidFill>
+          <a:ln w="38100">
+            <a:solidFill>
+              <a:schemeClr val="accent6">
+                <a:lumMod val="75000"/>
+              </a:schemeClr>
+            </a:solidFill>
+          </a:ln>
+        </p:spPr>
+        <p:style>
+          <a:lnRef idx="2">
+            <a:schemeClr val="accent5"/>
+          </a:lnRef>
+          <a:fillRef idx="1">
+            <a:schemeClr val="lt1"/>
+          </a:fillRef>
+          <a:effectRef idx="0">
+            <a:schemeClr val="accent5"/>
+          </a:effectRef>
+          <a:fontRef idx="minor">
+            <a:schemeClr val="dk1"/>
+          </a:fontRef>
+        </p:style>
+        <p:txBody>
+          <a:bodyPr wrap="square" lIns="0" tIns="0" rIns="0" bIns="36000" rtlCol="0" anchor="ctr">
+            <a:spAutoFit/>
+          </a:bodyPr>
+          <a:lstStyle/>
+          <a:p>
+            <a:pPr algn="ctr"/>
+            <a:r>
+              <a:rPr lang="en-US" sz="2000" noProof="1" smtClean="0"/>
+              <a:t>Gosho</a:t>
+            </a:r>
+            <a:endParaRPr lang="en-US" sz="2000" noProof="1"/>
+          </a:p>
+        </p:txBody>
+      </p:sp>
+      <p:sp>
+        <p:nvSpPr>
+          <p:cNvPr id="112" name="Rounded Rectangle 111"/>
+          <p:cNvSpPr/>
+          <p:nvPr/>
+        </p:nvSpPr>
+        <p:spPr>
+          <a:xfrm>
+            <a:off x="6611747" y="2999852"/>
+            <a:ext cx="818873" cy="433988"/>
+          </a:xfrm>
+          <a:prstGeom prst="roundRect">
+            <a:avLst>
+              <a:gd name="adj" fmla="val 35833"/>
+            </a:avLst>
+          </a:prstGeom>
+          <a:solidFill>
+            <a:schemeClr val="accent6">
+              <a:lumMod val="20000"/>
+              <a:lumOff val="80000"/>
+            </a:schemeClr>
+          </a:solidFill>
+          <a:ln w="38100">
+            <a:solidFill>
+              <a:schemeClr val="accent6">
+                <a:lumMod val="75000"/>
+              </a:schemeClr>
+            </a:solidFill>
+          </a:ln>
+        </p:spPr>
+        <p:style>
+          <a:lnRef idx="2">
+            <a:schemeClr val="accent5"/>
+          </a:lnRef>
+          <a:fillRef idx="1">
+            <a:schemeClr val="lt1"/>
+          </a:fillRef>
+          <a:effectRef idx="0">
+            <a:schemeClr val="accent5"/>
+          </a:effectRef>
+          <a:fontRef idx="minor">
+            <a:schemeClr val="dk1"/>
+          </a:fontRef>
+        </p:style>
+        <p:txBody>
+          <a:bodyPr wrap="square" lIns="0" tIns="0" rIns="0" bIns="36000" rtlCol="0" anchor="ctr">
+            <a:spAutoFit/>
+          </a:bodyPr>
+          <a:lstStyle/>
+          <a:p>
+            <a:pPr algn="ctr"/>
+            <a:r>
+              <a:rPr lang="en-US" sz="2000" noProof="1" smtClean="0"/>
+              <a:t>Penka</a:t>
+            </a:r>
+            <a:endParaRPr lang="en-US" sz="2000" noProof="1"/>
+          </a:p>
+        </p:txBody>
+      </p:sp>
+      <p:cxnSp>
+        <p:nvCxnSpPr>
+          <p:cNvPr id="113" name="Straight Connector 19"/>
+          <p:cNvCxnSpPr>
+            <a:stCxn id="107" idx="2"/>
+            <a:endCxn id="109" idx="1"/>
+          </p:cNvCxnSpPr>
+          <p:nvPr/>
+        </p:nvCxnSpPr>
+        <p:spPr>
+          <a:xfrm rot="16200000" flipH="1">
+            <a:off x="4991461" y="2739243"/>
+            <a:ext cx="721915" cy="230554"/>
+          </a:xfrm>
+          <a:prstGeom prst="curvedConnector2">
+            <a:avLst/>
+          </a:prstGeom>
+          <a:ln w="31750">
+            <a:solidFill>
+              <a:srgbClr val="C00000"/>
+            </a:solidFill>
+          </a:ln>
+        </p:spPr>
+        <p:style>
+          <a:lnRef idx="1">
+            <a:schemeClr val="accent1"/>
+          </a:lnRef>
+          <a:fillRef idx="0">
+            <a:schemeClr val="accent1"/>
+          </a:fillRef>
+          <a:effectRef idx="0">
+            <a:schemeClr val="accent1"/>
+          </a:effectRef>
+          <a:fontRef idx="minor">
+            <a:schemeClr val="tx1"/>
+          </a:fontRef>
+        </p:style>
+      </p:cxnSp>
+      <p:cxnSp>
+        <p:nvCxnSpPr>
+          <p:cNvPr id="114" name="Straight Connector 27"/>
+          <p:cNvCxnSpPr>
+            <a:stCxn id="107" idx="0"/>
+            <a:endCxn id="108" idx="1"/>
+          </p:cNvCxnSpPr>
+          <p:nvPr/>
+        </p:nvCxnSpPr>
+        <p:spPr>
+          <a:xfrm rot="5400000" flipH="1" flipV="1">
+            <a:off x="5376846" y="1405630"/>
+            <a:ext cx="514241" cy="793650"/>
+          </a:xfrm>
+          <a:prstGeom prst="curvedConnector2">
+            <a:avLst/>
+          </a:prstGeom>
+          <a:ln w="31750">
+            <a:solidFill>
+              <a:schemeClr val="accent6">
+                <a:lumMod val="75000"/>
+              </a:schemeClr>
+            </a:solidFill>
+          </a:ln>
+        </p:spPr>
+        <p:style>
+          <a:lnRef idx="1">
+            <a:schemeClr val="accent1"/>
+          </a:lnRef>
+          <a:fillRef idx="0">
+            <a:schemeClr val="accent1"/>
+          </a:fillRef>
+          <a:effectRef idx="0">
+            <a:schemeClr val="accent1"/>
+          </a:effectRef>
+          <a:fontRef idx="minor">
+            <a:schemeClr val="tx1"/>
+          </a:fontRef>
+        </p:style>
+      </p:cxnSp>
+      <p:cxnSp>
+        <p:nvCxnSpPr>
+          <p:cNvPr id="115" name="Straight Connector 32"/>
+          <p:cNvCxnSpPr>
+            <a:stCxn id="109" idx="3"/>
+            <a:endCxn id="112" idx="1"/>
+          </p:cNvCxnSpPr>
+          <p:nvPr/>
+        </p:nvCxnSpPr>
+        <p:spPr>
+          <a:xfrm>
+            <a:off x="6395542" y="3215478"/>
+            <a:ext cx="216205" cy="1368"/>
+          </a:xfrm>
+          <a:prstGeom prst="curvedConnector3">
+            <a:avLst>
+              <a:gd name="adj1" fmla="val 50000"/>
+            </a:avLst>
+          </a:prstGeom>
+          <a:ln w="31750">
+            <a:solidFill>
+              <a:schemeClr val="accent6">
+                <a:lumMod val="75000"/>
+              </a:schemeClr>
+            </a:solidFill>
+          </a:ln>
+        </p:spPr>
+        <p:style>
+          <a:lnRef idx="1">
+            <a:schemeClr val="accent1"/>
+          </a:lnRef>
+          <a:fillRef idx="0">
+            <a:schemeClr val="accent1"/>
+          </a:fillRef>
+          <a:effectRef idx="0">
+            <a:schemeClr val="accent1"/>
+          </a:effectRef>
+          <a:fontRef idx="minor">
+            <a:schemeClr val="tx1"/>
+          </a:fontRef>
+        </p:style>
+      </p:cxnSp>
+      <p:cxnSp>
+        <p:nvCxnSpPr>
+          <p:cNvPr id="116" name="Straight Connector 43"/>
+          <p:cNvCxnSpPr>
+            <a:stCxn id="108" idx="3"/>
+            <a:endCxn id="111" idx="0"/>
+          </p:cNvCxnSpPr>
+          <p:nvPr/>
+        </p:nvCxnSpPr>
+        <p:spPr>
+          <a:xfrm>
+            <a:off x="6760292" y="1545334"/>
+            <a:ext cx="840857" cy="445879"/>
+          </a:xfrm>
+          <a:prstGeom prst="curvedConnector2">
+            <a:avLst/>
+          </a:prstGeom>
+          <a:ln w="31750">
+            <a:solidFill>
+              <a:srgbClr val="C00000"/>
+            </a:solidFill>
+          </a:ln>
+        </p:spPr>
+        <p:style>
+          <a:lnRef idx="1">
+            <a:schemeClr val="accent1"/>
+          </a:lnRef>
+          <a:fillRef idx="0">
+            <a:schemeClr val="accent1"/>
+          </a:fillRef>
+          <a:effectRef idx="0">
+            <a:schemeClr val="accent1"/>
+          </a:effectRef>
+          <a:fontRef idx="minor">
+            <a:schemeClr val="tx1"/>
+          </a:fontRef>
+        </p:style>
+      </p:cxnSp>
+      <p:sp>
+        <p:nvSpPr>
+          <p:cNvPr id="117" name="Rounded Rectangle 116"/>
+          <p:cNvSpPr/>
+          <p:nvPr/>
+        </p:nvSpPr>
+        <p:spPr>
+          <a:xfrm>
+            <a:off x="8495705" y="1992445"/>
+            <a:ext cx="927847" cy="433988"/>
+          </a:xfrm>
+          <a:prstGeom prst="roundRect">
+            <a:avLst>
+              <a:gd name="adj" fmla="val 35833"/>
+            </a:avLst>
+          </a:prstGeom>
+          <a:solidFill>
+            <a:schemeClr val="accent6">
+              <a:lumMod val="20000"/>
+              <a:lumOff val="80000"/>
+            </a:schemeClr>
+          </a:solidFill>
+          <a:ln w="38100">
+            <a:solidFill>
+              <a:schemeClr val="accent6">
+                <a:lumMod val="75000"/>
+              </a:schemeClr>
+            </a:solidFill>
+          </a:ln>
+        </p:spPr>
+        <p:style>
+          <a:lnRef idx="2">
+            <a:schemeClr val="accent5"/>
+          </a:lnRef>
+          <a:fillRef idx="1">
+            <a:schemeClr val="lt1"/>
+          </a:fillRef>
+          <a:effectRef idx="0">
+            <a:schemeClr val="accent5"/>
+          </a:effectRef>
+          <a:fontRef idx="minor">
+            <a:schemeClr val="dk1"/>
+          </a:fontRef>
+        </p:style>
+        <p:txBody>
+          <a:bodyPr lIns="0" tIns="0" rIns="0" bIns="36000" rtlCol="0" anchor="ctr">
+            <a:spAutoFit/>
+          </a:bodyPr>
+          <a:lstStyle/>
+          <a:p>
+            <a:pPr algn="ctr"/>
+            <a:r>
+              <a:rPr lang="en-US" sz="2000" noProof="1" smtClean="0"/>
+              <a:t>Kiril</a:t>
+            </a:r>
+            <a:endParaRPr lang="en-US" sz="2000" noProof="1"/>
+          </a:p>
+        </p:txBody>
+      </p:sp>
+      <p:sp>
+        <p:nvSpPr>
+          <p:cNvPr id="118" name="Rounded Rectangle 117"/>
+          <p:cNvSpPr/>
+          <p:nvPr/>
+        </p:nvSpPr>
+        <p:spPr>
+          <a:xfrm>
+            <a:off x="11264153" y="2000912"/>
+            <a:ext cx="927847" cy="433988"/>
+          </a:xfrm>
+          <a:prstGeom prst="roundRect">
+            <a:avLst>
+              <a:gd name="adj" fmla="val 35833"/>
+            </a:avLst>
+          </a:prstGeom>
+          <a:solidFill>
+            <a:schemeClr val="accent6">
+              <a:lumMod val="20000"/>
+              <a:lumOff val="80000"/>
+            </a:schemeClr>
+          </a:solidFill>
+          <a:ln w="38100">
+            <a:solidFill>
+              <a:schemeClr val="accent6">
+                <a:lumMod val="75000"/>
+              </a:schemeClr>
+            </a:solidFill>
+          </a:ln>
+        </p:spPr>
+        <p:style>
+          <a:lnRef idx="2">
+            <a:schemeClr val="accent5"/>
+          </a:lnRef>
+          <a:fillRef idx="1">
+            <a:schemeClr val="lt1"/>
+          </a:fillRef>
+          <a:effectRef idx="0">
+            <a:schemeClr val="accent5"/>
+          </a:effectRef>
+          <a:fontRef idx="minor">
+            <a:schemeClr val="dk1"/>
+          </a:fontRef>
+        </p:style>
+        <p:txBody>
+          <a:bodyPr lIns="0" tIns="0" rIns="0" bIns="36000" rtlCol="0" anchor="ctr">
+            <a:spAutoFit/>
+          </a:bodyPr>
+          <a:lstStyle/>
+          <a:p>
+            <a:pPr algn="ctr"/>
+            <a:r>
+              <a:rPr lang="en-US" sz="2000" noProof="1" smtClean="0"/>
+              <a:t>Asen</a:t>
+            </a:r>
+            <a:endParaRPr lang="en-US" sz="2000" noProof="1"/>
+          </a:p>
+        </p:txBody>
+      </p:sp>
+      <p:cxnSp>
+        <p:nvCxnSpPr>
+          <p:cNvPr id="119" name="Straight Connector 83"/>
+          <p:cNvCxnSpPr>
+            <a:stCxn id="111" idx="3"/>
+            <a:endCxn id="117" idx="1"/>
+          </p:cNvCxnSpPr>
+          <p:nvPr/>
+        </p:nvCxnSpPr>
+        <p:spPr>
+          <a:xfrm>
+            <a:off x="8034324" y="2208207"/>
+            <a:ext cx="461381" cy="1232"/>
+          </a:xfrm>
+          <a:prstGeom prst="curvedConnector3">
+            <a:avLst>
+              <a:gd name="adj1" fmla="val 50000"/>
+            </a:avLst>
+          </a:prstGeom>
+          <a:ln w="31750">
+            <a:solidFill>
+              <a:schemeClr val="accent6">
+                <a:lumMod val="75000"/>
+              </a:schemeClr>
+            </a:solidFill>
+          </a:ln>
+        </p:spPr>
+        <p:style>
+          <a:lnRef idx="1">
+            <a:schemeClr val="accent1"/>
+          </a:lnRef>
+          <a:fillRef idx="0">
+            <a:schemeClr val="accent1"/>
+          </a:fillRef>
+          <a:effectRef idx="0">
+            <a:schemeClr val="accent1"/>
+          </a:effectRef>
+          <a:fontRef idx="minor">
+            <a:schemeClr val="tx1"/>
+          </a:fontRef>
+        </p:style>
+      </p:cxnSp>
+      <p:cxnSp>
+        <p:nvCxnSpPr>
+          <p:cNvPr id="120" name="Straight Connector 119"/>
+          <p:cNvCxnSpPr>
+            <a:stCxn id="117" idx="3"/>
+            <a:endCxn id="110" idx="1"/>
+          </p:cNvCxnSpPr>
+          <p:nvPr/>
+        </p:nvCxnSpPr>
+        <p:spPr>
+          <a:xfrm>
+            <a:off x="9423552" y="2209439"/>
+            <a:ext cx="351959" cy="8467"/>
+          </a:xfrm>
+          <a:prstGeom prst="line">
+            <a:avLst/>
+          </a:prstGeom>
+          <a:ln w="31750">
+            <a:solidFill>
+              <a:srgbClr val="C00000"/>
+            </a:solidFill>
+          </a:ln>
+        </p:spPr>
+        <p:style>
+          <a:lnRef idx="1">
+            <a:schemeClr val="accent1"/>
+          </a:lnRef>
+          <a:fillRef idx="0">
+            <a:schemeClr val="accent1"/>
+          </a:fillRef>
+          <a:effectRef idx="0">
+            <a:schemeClr val="accent1"/>
+          </a:effectRef>
+          <a:fontRef idx="minor">
+            <a:schemeClr val="tx1"/>
+          </a:fontRef>
+        </p:style>
+      </p:cxnSp>
+      <p:cxnSp>
+        <p:nvCxnSpPr>
+          <p:cNvPr id="121" name="Straight Connector 120"/>
+          <p:cNvCxnSpPr>
+            <a:stCxn id="110" idx="3"/>
+            <a:endCxn id="118" idx="1"/>
+          </p:cNvCxnSpPr>
+          <p:nvPr/>
+        </p:nvCxnSpPr>
+        <p:spPr>
+          <a:xfrm>
+            <a:off x="10883936" y="2217906"/>
+            <a:ext cx="380217" cy="0"/>
+          </a:xfrm>
+          <a:prstGeom prst="line">
+            <a:avLst/>
+          </a:prstGeom>
+          <a:ln w="31750">
+            <a:solidFill>
+              <a:schemeClr val="accent6">
+                <a:lumMod val="75000"/>
+              </a:schemeClr>
+            </a:solidFill>
+          </a:ln>
+        </p:spPr>
+        <p:style>
+          <a:lnRef idx="1">
+            <a:schemeClr val="accent1"/>
+          </a:lnRef>
+          <a:fillRef idx="0">
+            <a:schemeClr val="accent1"/>
+          </a:fillRef>
+          <a:effectRef idx="0">
+            <a:schemeClr val="accent1"/>
+          </a:effectRef>
+          <a:fontRef idx="minor">
+            <a:schemeClr val="tx1"/>
+          </a:fontRef>
+        </p:style>
+      </p:cxnSp>
+      <p:cxnSp>
+        <p:nvCxnSpPr>
+          <p:cNvPr id="124" name="Straight Connector 36"/>
+          <p:cNvCxnSpPr>
+            <a:stCxn id="112" idx="3"/>
+            <a:endCxn id="111" idx="2"/>
+          </p:cNvCxnSpPr>
+          <p:nvPr/>
+        </p:nvCxnSpPr>
+        <p:spPr>
+          <a:xfrm flipV="1">
+            <a:off x="7430620" y="2425201"/>
+            <a:ext cx="170529" cy="791645"/>
+          </a:xfrm>
+          <a:prstGeom prst="curvedConnector2">
+            <a:avLst/>
+          </a:prstGeom>
+          <a:ln w="31750">
+            <a:solidFill>
+              <a:srgbClr val="C00000"/>
+            </a:solidFill>
+          </a:ln>
+        </p:spPr>
+        <p:style>
+          <a:lnRef idx="1">
+            <a:schemeClr val="accent1"/>
+          </a:lnRef>
+          <a:fillRef idx="0">
+            <a:schemeClr val="accent1"/>
+          </a:fillRef>
+          <a:effectRef idx="0">
+            <a:schemeClr val="accent1"/>
+          </a:effectRef>
+          <a:fontRef idx="minor">
+            <a:schemeClr val="tx1"/>
           </a:fontRef>
         </p:style>
       </p:cxnSp>
@@ -14589,6 +15403,13 @@
   <p:clrMapOvr>
     <a:masterClrMapping/>
   </p:clrMapOvr>
+  <p:timing>
+    <p:tnLst>
+      <p:par>
+        <p:cTn id="1" dur="indefinite" restart="never" nodeType="tmRoot"/>
+      </p:par>
+    </p:tnLst>
+  </p:timing>
 </p:sld>
 </file>
 
@@ -16535,6 +17356,13 @@
   <p:clrMapOvr>
     <a:masterClrMapping/>
   </p:clrMapOvr>
+  <p:timing>
+    <p:tnLst>
+      <p:par>
+        <p:cTn id="1" dur="indefinite" restart="never" nodeType="tmRoot"/>
+      </p:par>
+    </p:tnLst>
+  </p:timing>
 </p:sld>
 </file>
 
@@ -18611,6 +19439,13 @@
   <p:clrMapOvr>
     <a:masterClrMapping/>
   </p:clrMapOvr>
+  <p:timing>
+    <p:tnLst>
+      <p:par>
+        <p:cTn id="1" dur="indefinite" restart="never" nodeType="tmRoot"/>
+      </p:par>
+    </p:tnLst>
+  </p:timing>
 </p:sld>
 </file>
 
@@ -23969,7 +24804,7 @@
     </a:clrScheme>
     <a:fontScheme name="Office">
       <a:majorFont>
-        <a:latin typeface="Calibri Light" panose="020F0302020204030204"/>
+        <a:latin typeface="Calibri Light"/>
         <a:ea typeface=""/>
         <a:cs typeface=""/>
         <a:font script="Jpan" typeface="ＭＳ Ｐゴシック"/>
@@ -24004,7 +24839,7 @@
         <a:font script="Geor" typeface="Sylfaen"/>
       </a:majorFont>
       <a:minorFont>
-        <a:latin typeface="Calibri" panose="020F0502020204030204"/>
+        <a:latin typeface="Calibri"/>
         <a:ea typeface=""/>
         <a:cs typeface=""/>
         <a:font script="Jpan" typeface="ＭＳ Ｐゴシック"/>
@@ -24181,7 +25016,7 @@
   <a:extraClrSchemeLst/>
   <a:extLst>
     <a:ext uri="{05A4C25C-085E-4340-85A3-A5531E510DB2}">
-      <thm15:themeFamily xmlns:thm15="http://schemas.microsoft.com/office/thememl/2012/main" name="Office Theme" id="{62F939B6-93AF-4DB8-9C6B-D6C7DFDC589F}" vid="{4A3C46E8-61CC-4603-A589-7422A47A8E4A}"/>
+      <thm15:themeFamily xmlns:thm15="http://schemas.microsoft.com/office/thememl/2012/main" xmlns="" name="Office Theme" id="{62F939B6-93AF-4DB8-9C6B-D6C7DFDC589F}" vid="{4A3C46E8-61CC-4603-A589-7422A47A8E4A}"/>
     </a:ext>
   </a:extLst>
 </a:theme>

</xml_diff>